<commit_message>
finished fmri + eeg-fmri
</commit_message>
<xml_diff>
--- a/Fig/Methods/fMRI_pipeline/fMRI_pipeline_perso.pptx
+++ b/Fig/Methods/fMRI_pipeline/fMRI_pipeline_perso.pptx
@@ -5,8 +5,8 @@
     <p:sldMasterId id="2147483660" r:id="rId1"/>
   </p:sldMasterIdLst>
   <p:sldIdLst>
-    <p:sldId id="256" r:id="rId2"/>
-    <p:sldId id="257" r:id="rId3"/>
+    <p:sldId id="257" r:id="rId2"/>
+    <p:sldId id="256" r:id="rId3"/>
   </p:sldIdLst>
   <p:sldSz cx="5759450" cy="3600450"/>
   <p:notesSz cx="6858000" cy="9144000"/>
@@ -3003,15 +3003,13 @@
       <p:cxnSp>
         <p:nvCxnSpPr>
           <p:cNvPr id="37" name="Connecteur en angle 36"/>
-          <p:cNvCxnSpPr>
-            <a:stCxn id="19" idx="2"/>
-          </p:cNvCxnSpPr>
+          <p:cNvCxnSpPr/>
           <p:nvPr/>
         </p:nvCxnSpPr>
         <p:spPr>
           <a:xfrm rot="16200000" flipH="1">
-            <a:off x="3369277" y="676022"/>
-            <a:ext cx="170588" cy="3357192"/>
+            <a:off x="2992225" y="1054656"/>
+            <a:ext cx="144000" cy="2580015"/>
           </a:xfrm>
           <a:prstGeom prst="bentConnector2">
             <a:avLst/>
@@ -3051,48 +3049,8 @@
         </p:nvCxnSpPr>
         <p:spPr>
           <a:xfrm rot="16200000">
-            <a:off x="4103745" y="2349910"/>
-            <a:ext cx="180000" cy="0"/>
-          </a:xfrm>
-          <a:prstGeom prst="straightConnector1">
-            <a:avLst/>
-          </a:prstGeom>
-          <a:ln w="9525">
-            <a:solidFill>
-              <a:schemeClr val="tx1">
-                <a:lumMod val="65000"/>
-                <a:lumOff val="35000"/>
-              </a:schemeClr>
-            </a:solidFill>
-            <a:prstDash val="solid"/>
-            <a:tailEnd type="triangle"/>
-          </a:ln>
-        </p:spPr>
-        <p:style>
-          <a:lnRef idx="1">
-            <a:schemeClr val="accent1"/>
-          </a:lnRef>
-          <a:fillRef idx="0">
-            <a:schemeClr val="accent1"/>
-          </a:fillRef>
-          <a:effectRef idx="0">
-            <a:schemeClr val="accent1"/>
-          </a:effectRef>
-          <a:fontRef idx="minor">
-            <a:schemeClr val="tx1"/>
-          </a:fontRef>
-        </p:style>
-      </p:cxnSp>
-      <p:cxnSp>
-        <p:nvCxnSpPr>
-          <p:cNvPr id="39" name="Connecteur droit avec flèche 38"/>
-          <p:cNvCxnSpPr/>
-          <p:nvPr/>
-        </p:nvCxnSpPr>
-        <p:spPr>
-          <a:xfrm rot="16200000">
-            <a:off x="5040086" y="2349910"/>
-            <a:ext cx="180000" cy="0"/>
+            <a:off x="4282233" y="2350942"/>
+            <a:ext cx="144000" cy="0"/>
           </a:xfrm>
           <a:prstGeom prst="straightConnector1">
             <a:avLst/>
@@ -3642,7 +3600,7 @@
         </p:nvSpPr>
         <p:spPr>
           <a:xfrm>
-            <a:off x="4195706" y="476235"/>
+            <a:off x="3918650" y="482113"/>
             <a:ext cx="876711" cy="384721"/>
           </a:xfrm>
           <a:prstGeom prst="rect">
@@ -3744,7 +3702,7 @@
         <p:spPr>
           <a:xfrm>
             <a:off x="3572064" y="577218"/>
-            <a:ext cx="504000" cy="0"/>
+            <a:ext cx="252000" cy="0"/>
           </a:xfrm>
           <a:prstGeom prst="straightConnector1">
             <a:avLst/>
@@ -3867,7 +3825,7 @@
         <p:spPr>
           <a:xfrm>
             <a:off x="2637550" y="1047836"/>
-            <a:ext cx="888123" cy="1231106"/>
+            <a:ext cx="888123" cy="1184940"/>
           </a:xfrm>
           <a:prstGeom prst="rect">
             <a:avLst/>
@@ -4019,7 +3977,7 @@
           <a:p>
             <a:pPr algn="ctr"/>
             <a:r>
-              <a:rPr lang="en-US" sz="500" i="1" dirty="0" smtClean="0">
+              <a:rPr lang="en-US" sz="600" i="1" dirty="0" smtClean="0">
                 <a:solidFill>
                   <a:schemeClr val="accent2">
                     <a:lumMod val="75000"/>
@@ -4028,8 +3986,41 @@
                 <a:latin typeface="Roboto Light" panose="02000000000000000000" pitchFamily="2" charset="0"/>
                 <a:ea typeface="Roboto Light" panose="02000000000000000000" pitchFamily="2" charset="0"/>
               </a:rPr>
-              <a:t>Random Gaussian fields, Monte-Carlo, permutation-based…</a:t>
-            </a:r>
+              <a:t>Gaussian </a:t>
+            </a:r>
+            <a:r>
+              <a:rPr lang="en-US" sz="600" i="1" dirty="0" smtClean="0">
+                <a:solidFill>
+                  <a:schemeClr val="accent2">
+                    <a:lumMod val="75000"/>
+                  </a:schemeClr>
+                </a:solidFill>
+                <a:latin typeface="Roboto Light" panose="02000000000000000000" pitchFamily="2" charset="0"/>
+                <a:ea typeface="Roboto Light" panose="02000000000000000000" pitchFamily="2" charset="0"/>
+              </a:rPr>
+              <a:t>fields, </a:t>
+            </a:r>
+            <a:r>
+              <a:rPr lang="en-US" sz="600" i="1" dirty="0" smtClean="0">
+                <a:solidFill>
+                  <a:schemeClr val="accent2">
+                    <a:lumMod val="75000"/>
+                  </a:schemeClr>
+                </a:solidFill>
+                <a:latin typeface="Roboto Light" panose="02000000000000000000" pitchFamily="2" charset="0"/>
+                <a:ea typeface="Roboto Light" panose="02000000000000000000" pitchFamily="2" charset="0"/>
+              </a:rPr>
+              <a:t>Permutations</a:t>
+            </a:r>
+            <a:endParaRPr lang="en-US" sz="600" i="1" dirty="0" smtClean="0">
+              <a:solidFill>
+                <a:schemeClr val="accent2">
+                  <a:lumMod val="75000"/>
+                </a:schemeClr>
+              </a:solidFill>
+              <a:latin typeface="Roboto Light" panose="02000000000000000000" pitchFamily="2" charset="0"/>
+              <a:ea typeface="Roboto Light" panose="02000000000000000000" pitchFamily="2" charset="0"/>
+            </a:endParaRPr>
           </a:p>
         </p:txBody>
       </p:sp>
@@ -4089,10 +4080,10 @@
         </p:nvGrpSpPr>
         <p:grpSpPr>
           <a:xfrm>
-            <a:off x="3743438" y="1047836"/>
-            <a:ext cx="1828621" cy="1161857"/>
+            <a:off x="3911390" y="1047836"/>
+            <a:ext cx="889200" cy="1174681"/>
             <a:chOff x="3743438" y="1009932"/>
-            <a:chExt cx="1828621" cy="1161857"/>
+            <a:chExt cx="889200" cy="1174681"/>
           </a:xfrm>
         </p:grpSpPr>
         <p:sp>
@@ -4104,7 +4095,7 @@
           <p:spPr>
             <a:xfrm>
               <a:off x="3743438" y="1009932"/>
-              <a:ext cx="889200" cy="1161857"/>
+              <a:ext cx="889200" cy="1174681"/>
             </a:xfrm>
             <a:prstGeom prst="rect">
               <a:avLst/>
@@ -4175,7 +4166,47 @@
                   <a:latin typeface="Roboto" pitchFamily="2" charset="0"/>
                   <a:ea typeface="Roboto" pitchFamily="2" charset="0"/>
                 </a:rPr>
-                <a:t>ICA / PCA</a:t>
+                <a:t>ICA</a:t>
+              </a:r>
+            </a:p>
+            <a:p>
+              <a:pPr algn="ctr">
+                <a:lnSpc>
+                  <a:spcPct val="125000"/>
+                </a:lnSpc>
+              </a:pPr>
+              <a:r>
+                <a:rPr lang="en-US" sz="600" dirty="0" smtClean="0">
+                  <a:solidFill>
+                    <a:schemeClr val="tx1">
+                      <a:lumMod val="75000"/>
+                      <a:lumOff val="25000"/>
+                    </a:schemeClr>
+                  </a:solidFill>
+                  <a:latin typeface="Roboto" pitchFamily="2" charset="0"/>
+                  <a:ea typeface="Roboto" pitchFamily="2" charset="0"/>
+                </a:rPr>
+                <a:t>SEED-BASED</a:t>
+              </a:r>
+            </a:p>
+            <a:p>
+              <a:pPr algn="ctr">
+                <a:lnSpc>
+                  <a:spcPct val="125000"/>
+                </a:lnSpc>
+              </a:pPr>
+              <a:r>
+                <a:rPr lang="en-US" sz="600" i="1" dirty="0" smtClean="0">
+                  <a:solidFill>
+                    <a:schemeClr val="tx1">
+                      <a:lumMod val="75000"/>
+                      <a:lumOff val="25000"/>
+                    </a:schemeClr>
+                  </a:solidFill>
+                  <a:latin typeface="Roboto Light" panose="02000000000000000000" pitchFamily="2" charset="0"/>
+                  <a:ea typeface="Roboto Light" panose="02000000000000000000" pitchFamily="2" charset="0"/>
+                </a:rPr>
+                <a:t>Voxel-to-voxel</a:t>
               </a:r>
             </a:p>
             <a:p>
@@ -4188,15 +4219,15 @@
                 </a:spcAft>
               </a:pPr>
               <a:r>
-                <a:rPr lang="en-US" sz="600" dirty="0" smtClean="0">
+                <a:rPr lang="en-US" sz="600" i="1" dirty="0" smtClean="0">
                   <a:solidFill>
                     <a:schemeClr val="tx1">
                       <a:lumMod val="75000"/>
                       <a:lumOff val="25000"/>
                     </a:schemeClr>
                   </a:solidFill>
-                  <a:latin typeface="Roboto" pitchFamily="2" charset="0"/>
-                  <a:ea typeface="Roboto" pitchFamily="2" charset="0"/>
+                  <a:latin typeface="Roboto Light" panose="02000000000000000000" pitchFamily="2" charset="0"/>
+                  <a:ea typeface="Roboto Light" panose="02000000000000000000" pitchFamily="2" charset="0"/>
                 </a:rPr>
                 <a:t>ROI-to-ROI</a:t>
               </a:r>
@@ -4221,8 +4252,1569 @@
                   <a:latin typeface="Roboto" pitchFamily="2" charset="0"/>
                   <a:ea typeface="Roboto" pitchFamily="2" charset="0"/>
                 </a:rPr>
+                <a:t>GRAPH-BASED</a:t>
+              </a:r>
+              <a:endParaRPr lang="en-US" sz="600" dirty="0" smtClean="0">
+                <a:solidFill>
+                  <a:schemeClr val="tx1">
+                    <a:lumMod val="75000"/>
+                    <a:lumOff val="25000"/>
+                  </a:schemeClr>
+                </a:solidFill>
+                <a:latin typeface="Roboto" pitchFamily="2" charset="0"/>
+                <a:ea typeface="Roboto" pitchFamily="2" charset="0"/>
+              </a:endParaRPr>
+            </a:p>
+          </p:txBody>
+        </p:sp>
+        <p:sp>
+          <p:nvSpPr>
+            <p:cNvPr id="27" name="ZoneTexte 26"/>
+            <p:cNvSpPr txBox="1"/>
+            <p:nvPr/>
+          </p:nvSpPr>
+          <p:spPr>
+            <a:xfrm>
+              <a:off x="3743438" y="1009932"/>
+              <a:ext cx="889200" cy="307777"/>
+            </a:xfrm>
+            <a:prstGeom prst="rect">
+              <a:avLst/>
+            </a:prstGeom>
+            <a:solidFill>
+              <a:schemeClr val="tx1">
+                <a:lumMod val="75000"/>
+                <a:lumOff val="25000"/>
+              </a:schemeClr>
+            </a:solidFill>
+            <a:ln>
+              <a:solidFill>
+                <a:schemeClr val="tx1">
+                  <a:lumMod val="75000"/>
+                  <a:lumOff val="25000"/>
+                </a:schemeClr>
+              </a:solidFill>
+            </a:ln>
+          </p:spPr>
+          <p:txBody>
+            <a:bodyPr wrap="square" numCol="1" rtlCol="0">
+              <a:spAutoFit/>
+            </a:bodyPr>
+            <a:lstStyle/>
+            <a:p>
+              <a:pPr algn="ctr"/>
+              <a:r>
+                <a:rPr lang="en-US" sz="700" i="1" dirty="0" smtClean="0">
+                  <a:solidFill>
+                    <a:schemeClr val="bg1"/>
+                  </a:solidFill>
+                  <a:latin typeface="Roboto" pitchFamily="2" charset="0"/>
+                  <a:ea typeface="Roboto" pitchFamily="2" charset="0"/>
+                </a:rPr>
+                <a:t>FUNCTIONAL</a:t>
+              </a:r>
+            </a:p>
+            <a:p>
+              <a:pPr algn="ctr"/>
+              <a:r>
+                <a:rPr lang="en-US" sz="700" i="1" dirty="0" smtClean="0">
+                  <a:solidFill>
+                    <a:schemeClr val="bg1"/>
+                  </a:solidFill>
+                  <a:latin typeface="Roboto" pitchFamily="2" charset="0"/>
+                  <a:ea typeface="Roboto" pitchFamily="2" charset="0"/>
+                </a:rPr>
+                <a:t>CONNECTIVITY</a:t>
+              </a:r>
+              <a:endParaRPr lang="en-US" sz="700" i="1" dirty="0">
+                <a:solidFill>
+                  <a:schemeClr val="bg1"/>
+                </a:solidFill>
+                <a:latin typeface="Roboto" pitchFamily="2" charset="0"/>
+                <a:ea typeface="Roboto" pitchFamily="2" charset="0"/>
+              </a:endParaRPr>
+            </a:p>
+          </p:txBody>
+        </p:sp>
+      </p:grpSp>
+      <p:cxnSp>
+        <p:nvCxnSpPr>
+          <p:cNvPr id="32" name="Connecteur droit 31"/>
+          <p:cNvCxnSpPr/>
+          <p:nvPr/>
+        </p:nvCxnSpPr>
+        <p:spPr>
+          <a:xfrm>
+            <a:off x="3906161" y="1546879"/>
+            <a:ext cx="889200" cy="0"/>
+          </a:xfrm>
+          <a:prstGeom prst="line">
+            <a:avLst/>
+          </a:prstGeom>
+          <a:ln>
+            <a:solidFill>
+              <a:schemeClr val="tx1">
+                <a:lumMod val="75000"/>
+                <a:lumOff val="25000"/>
+              </a:schemeClr>
+            </a:solidFill>
+          </a:ln>
+        </p:spPr>
+        <p:style>
+          <a:lnRef idx="1">
+            <a:schemeClr val="accent1"/>
+          </a:lnRef>
+          <a:fillRef idx="0">
+            <a:schemeClr val="accent1"/>
+          </a:fillRef>
+          <a:effectRef idx="0">
+            <a:schemeClr val="accent1"/>
+          </a:effectRef>
+          <a:fontRef idx="minor">
+            <a:schemeClr val="tx1"/>
+          </a:fontRef>
+        </p:style>
+      </p:cxnSp>
+      <p:cxnSp>
+        <p:nvCxnSpPr>
+          <p:cNvPr id="33" name="Connecteur droit 32"/>
+          <p:cNvCxnSpPr/>
+          <p:nvPr/>
+        </p:nvCxnSpPr>
+        <p:spPr>
+          <a:xfrm>
+            <a:off x="3906161" y="1994980"/>
+            <a:ext cx="889200" cy="0"/>
+          </a:xfrm>
+          <a:prstGeom prst="line">
+            <a:avLst/>
+          </a:prstGeom>
+          <a:ln>
+            <a:solidFill>
+              <a:schemeClr val="tx1">
+                <a:lumMod val="75000"/>
+                <a:lumOff val="25000"/>
+              </a:schemeClr>
+            </a:solidFill>
+          </a:ln>
+        </p:spPr>
+        <p:style>
+          <a:lnRef idx="1">
+            <a:schemeClr val="accent1"/>
+          </a:lnRef>
+          <a:fillRef idx="0">
+            <a:schemeClr val="accent1"/>
+          </a:fillRef>
+          <a:effectRef idx="0">
+            <a:schemeClr val="accent1"/>
+          </a:effectRef>
+          <a:fontRef idx="minor">
+            <a:schemeClr val="tx1"/>
+          </a:fontRef>
+        </p:style>
+      </p:cxnSp>
+      <p:cxnSp>
+        <p:nvCxnSpPr>
+          <p:cNvPr id="42" name="Connecteur en angle 41"/>
+          <p:cNvCxnSpPr>
+            <a:stCxn id="10" idx="2"/>
+          </p:cNvCxnSpPr>
+          <p:nvPr/>
+        </p:nvCxnSpPr>
+        <p:spPr>
+          <a:xfrm rot="5400000">
+            <a:off x="2403502" y="145227"/>
+            <a:ext cx="59632" cy="1314688"/>
+          </a:xfrm>
+          <a:prstGeom prst="bentConnector2">
+            <a:avLst/>
+          </a:prstGeom>
+          <a:ln w="9525">
+            <a:solidFill>
+              <a:schemeClr val="tx1">
+                <a:lumMod val="65000"/>
+                <a:lumOff val="35000"/>
+              </a:schemeClr>
+            </a:solidFill>
+            <a:prstDash val="solid"/>
+            <a:headEnd type="none" w="med" len="med"/>
+            <a:tailEnd type="none" w="med" len="med"/>
+          </a:ln>
+        </p:spPr>
+        <p:style>
+          <a:lnRef idx="1">
+            <a:schemeClr val="accent1"/>
+          </a:lnRef>
+          <a:fillRef idx="0">
+            <a:schemeClr val="accent1"/>
+          </a:fillRef>
+          <a:effectRef idx="0">
+            <a:schemeClr val="accent1"/>
+          </a:effectRef>
+          <a:fontRef idx="minor">
+            <a:schemeClr val="tx1"/>
+          </a:fontRef>
+        </p:style>
+      </p:cxnSp>
+      <p:cxnSp>
+        <p:nvCxnSpPr>
+          <p:cNvPr id="43" name="Connecteur droit avec flèche 42"/>
+          <p:cNvCxnSpPr/>
+          <p:nvPr/>
+        </p:nvCxnSpPr>
+        <p:spPr>
+          <a:xfrm rot="5400000">
+            <a:off x="1685974" y="922190"/>
+            <a:ext cx="180000" cy="0"/>
+          </a:xfrm>
+          <a:prstGeom prst="straightConnector1">
+            <a:avLst/>
+          </a:prstGeom>
+          <a:ln w="9525">
+            <a:solidFill>
+              <a:schemeClr val="bg2">
+                <a:lumMod val="25000"/>
+              </a:schemeClr>
+            </a:solidFill>
+            <a:prstDash val="solid"/>
+            <a:tailEnd type="triangle"/>
+          </a:ln>
+        </p:spPr>
+        <p:style>
+          <a:lnRef idx="1">
+            <a:schemeClr val="accent1"/>
+          </a:lnRef>
+          <a:fillRef idx="0">
+            <a:schemeClr val="accent1"/>
+          </a:fillRef>
+          <a:effectRef idx="0">
+            <a:schemeClr val="accent1"/>
+          </a:effectRef>
+          <a:fontRef idx="minor">
+            <a:schemeClr val="tx1"/>
+          </a:fontRef>
+        </p:style>
+      </p:cxnSp>
+      <p:cxnSp>
+        <p:nvCxnSpPr>
+          <p:cNvPr id="50" name="Connecteur droit avec flèche 49"/>
+          <p:cNvCxnSpPr/>
+          <p:nvPr/>
+        </p:nvCxnSpPr>
+        <p:spPr>
+          <a:xfrm rot="5400000">
+            <a:off x="4288319" y="932956"/>
+            <a:ext cx="144000" cy="0"/>
+          </a:xfrm>
+          <a:prstGeom prst="straightConnector1">
+            <a:avLst/>
+          </a:prstGeom>
+          <a:ln w="9525">
+            <a:solidFill>
+              <a:schemeClr val="tx1">
+                <a:lumMod val="65000"/>
+                <a:lumOff val="35000"/>
+              </a:schemeClr>
+            </a:solidFill>
+            <a:prstDash val="solid"/>
+            <a:tailEnd type="triangle"/>
+          </a:ln>
+        </p:spPr>
+        <p:style>
+          <a:lnRef idx="1">
+            <a:schemeClr val="accent1"/>
+          </a:lnRef>
+          <a:fillRef idx="0">
+            <a:schemeClr val="accent1"/>
+          </a:fillRef>
+          <a:effectRef idx="0">
+            <a:schemeClr val="accent1"/>
+          </a:effectRef>
+          <a:fontRef idx="minor">
+            <a:schemeClr val="tx1"/>
+          </a:fontRef>
+        </p:style>
+      </p:cxnSp>
+    </p:spTree>
+    <p:extLst>
+      <p:ext uri="{BB962C8B-B14F-4D97-AF65-F5344CB8AC3E}">
+        <p14:creationId xmlns:p14="http://schemas.microsoft.com/office/powerpoint/2010/main" val="3726677745"/>
+      </p:ext>
+    </p:extLst>
+  </p:cSld>
+  <p:clrMapOvr>
+    <a:masterClrMapping/>
+  </p:clrMapOvr>
+</p:sld>
+</file>
+
+<file path=ppt/slides/slide2.xml><?xml version="1.0" encoding="utf-8"?>
+<p:sld xmlns:a="http://schemas.openxmlformats.org/drawingml/2006/main" xmlns:r="http://schemas.openxmlformats.org/officeDocument/2006/relationships" xmlns:p="http://schemas.openxmlformats.org/presentationml/2006/main">
+  <p:cSld>
+    <p:spTree>
+      <p:nvGrpSpPr>
+        <p:cNvPr id="1" name=""/>
+        <p:cNvGrpSpPr/>
+        <p:nvPr/>
+      </p:nvGrpSpPr>
+      <p:grpSpPr>
+        <a:xfrm>
+          <a:off x="0" y="0"/>
+          <a:ext cx="0" cy="0"/>
+          <a:chOff x="0" y="0"/>
+          <a:chExt cx="0" cy="0"/>
+        </a:xfrm>
+      </p:grpSpPr>
+      <p:cxnSp>
+        <p:nvCxnSpPr>
+          <p:cNvPr id="37" name="Connecteur en angle 36"/>
+          <p:cNvCxnSpPr>
+            <a:stCxn id="19" idx="2"/>
+          </p:cNvCxnSpPr>
+          <p:nvPr/>
+        </p:nvCxnSpPr>
+        <p:spPr>
+          <a:xfrm rot="16200000" flipH="1">
+            <a:off x="3369277" y="676022"/>
+            <a:ext cx="170588" cy="3357192"/>
+          </a:xfrm>
+          <a:prstGeom prst="bentConnector2">
+            <a:avLst/>
+          </a:prstGeom>
+          <a:ln w="9525">
+            <a:solidFill>
+              <a:schemeClr val="tx1">
+                <a:lumMod val="65000"/>
+                <a:lumOff val="35000"/>
+              </a:schemeClr>
+            </a:solidFill>
+            <a:prstDash val="solid"/>
+            <a:headEnd type="none" w="med" len="med"/>
+            <a:tailEnd type="none" w="med" len="med"/>
+          </a:ln>
+        </p:spPr>
+        <p:style>
+          <a:lnRef idx="1">
+            <a:schemeClr val="dk1"/>
+          </a:lnRef>
+          <a:fillRef idx="0">
+            <a:schemeClr val="dk1"/>
+          </a:fillRef>
+          <a:effectRef idx="0">
+            <a:schemeClr val="dk1"/>
+          </a:effectRef>
+          <a:fontRef idx="minor">
+            <a:schemeClr val="tx1"/>
+          </a:fontRef>
+        </p:style>
+      </p:cxnSp>
+      <p:cxnSp>
+        <p:nvCxnSpPr>
+          <p:cNvPr id="38" name="Connecteur droit avec flèche 37"/>
+          <p:cNvCxnSpPr/>
+          <p:nvPr/>
+        </p:nvCxnSpPr>
+        <p:spPr>
+          <a:xfrm rot="16200000">
+            <a:off x="4103745" y="2349910"/>
+            <a:ext cx="180000" cy="0"/>
+          </a:xfrm>
+          <a:prstGeom prst="straightConnector1">
+            <a:avLst/>
+          </a:prstGeom>
+          <a:ln w="9525">
+            <a:solidFill>
+              <a:schemeClr val="tx1">
+                <a:lumMod val="65000"/>
+                <a:lumOff val="35000"/>
+              </a:schemeClr>
+            </a:solidFill>
+            <a:prstDash val="solid"/>
+            <a:tailEnd type="triangle"/>
+          </a:ln>
+        </p:spPr>
+        <p:style>
+          <a:lnRef idx="1">
+            <a:schemeClr val="accent1"/>
+          </a:lnRef>
+          <a:fillRef idx="0">
+            <a:schemeClr val="accent1"/>
+          </a:fillRef>
+          <a:effectRef idx="0">
+            <a:schemeClr val="accent1"/>
+          </a:effectRef>
+          <a:fontRef idx="minor">
+            <a:schemeClr val="tx1"/>
+          </a:fontRef>
+        </p:style>
+      </p:cxnSp>
+      <p:cxnSp>
+        <p:nvCxnSpPr>
+          <p:cNvPr id="39" name="Connecteur droit avec flèche 38"/>
+          <p:cNvCxnSpPr/>
+          <p:nvPr/>
+        </p:nvCxnSpPr>
+        <p:spPr>
+          <a:xfrm rot="16200000">
+            <a:off x="5040086" y="2349910"/>
+            <a:ext cx="180000" cy="0"/>
+          </a:xfrm>
+          <a:prstGeom prst="straightConnector1">
+            <a:avLst/>
+          </a:prstGeom>
+          <a:ln w="9525">
+            <a:solidFill>
+              <a:schemeClr val="tx1">
+                <a:lumMod val="65000"/>
+                <a:lumOff val="35000"/>
+              </a:schemeClr>
+            </a:solidFill>
+            <a:prstDash val="solid"/>
+            <a:tailEnd type="triangle"/>
+          </a:ln>
+        </p:spPr>
+        <p:style>
+          <a:lnRef idx="1">
+            <a:schemeClr val="accent1"/>
+          </a:lnRef>
+          <a:fillRef idx="0">
+            <a:schemeClr val="accent1"/>
+          </a:fillRef>
+          <a:effectRef idx="0">
+            <a:schemeClr val="accent1"/>
+          </a:effectRef>
+          <a:fontRef idx="minor">
+            <a:schemeClr val="tx1"/>
+          </a:fontRef>
+        </p:style>
+      </p:cxnSp>
+      <p:sp>
+        <p:nvSpPr>
+          <p:cNvPr id="19" name="ZoneTexte 18"/>
+          <p:cNvSpPr txBox="1"/>
+          <p:nvPr/>
+        </p:nvSpPr>
+        <p:spPr>
+          <a:xfrm>
+            <a:off x="1331913" y="1047836"/>
+            <a:ext cx="888123" cy="1221488"/>
+          </a:xfrm>
+          <a:prstGeom prst="rect">
+            <a:avLst/>
+          </a:prstGeom>
+          <a:noFill/>
+          <a:ln>
+            <a:solidFill>
+              <a:schemeClr val="accent2"/>
+            </a:solidFill>
+          </a:ln>
+        </p:spPr>
+        <p:txBody>
+          <a:bodyPr wrap="square" rtlCol="0">
+            <a:spAutoFit/>
+          </a:bodyPr>
+          <a:lstStyle/>
+          <a:p>
+            <a:pPr algn="ctr">
+              <a:lnSpc>
+                <a:spcPct val="150000"/>
+              </a:lnSpc>
+            </a:pPr>
+            <a:endParaRPr lang="en-US" sz="600" i="1" dirty="0" smtClean="0">
+              <a:solidFill>
+                <a:schemeClr val="accent2">
+                  <a:lumMod val="75000"/>
+                </a:schemeClr>
+              </a:solidFill>
+              <a:latin typeface="Roboto" pitchFamily="2" charset="0"/>
+              <a:ea typeface="Roboto" pitchFamily="2" charset="0"/>
+            </a:endParaRPr>
+          </a:p>
+          <a:p>
+            <a:pPr algn="ctr">
+              <a:lnSpc>
+                <a:spcPct val="125000"/>
+              </a:lnSpc>
+              <a:spcBef>
+                <a:spcPts val="600"/>
+              </a:spcBef>
+            </a:pPr>
+            <a:r>
+              <a:rPr lang="en-US" sz="600" dirty="0" smtClean="0">
+                <a:solidFill>
+                  <a:schemeClr val="accent2">
+                    <a:lumMod val="75000"/>
+                  </a:schemeClr>
+                </a:solidFill>
+                <a:latin typeface="Roboto" pitchFamily="2" charset="0"/>
+                <a:ea typeface="Roboto" pitchFamily="2" charset="0"/>
+              </a:rPr>
+              <a:t>SLICE TIMING CORRECTION</a:t>
+            </a:r>
+          </a:p>
+          <a:p>
+            <a:pPr algn="ctr">
+              <a:lnSpc>
+                <a:spcPct val="125000"/>
+              </a:lnSpc>
+            </a:pPr>
+            <a:r>
+              <a:rPr lang="en-US" sz="600" dirty="0" smtClean="0">
+                <a:solidFill>
+                  <a:schemeClr val="accent2">
+                    <a:lumMod val="75000"/>
+                  </a:schemeClr>
+                </a:solidFill>
+                <a:latin typeface="Roboto" pitchFamily="2" charset="0"/>
+                <a:ea typeface="Roboto" pitchFamily="2" charset="0"/>
+              </a:rPr>
+              <a:t>▼</a:t>
+            </a:r>
+            <a:endParaRPr lang="en-US" sz="600" dirty="0">
+              <a:solidFill>
+                <a:schemeClr val="accent2">
+                  <a:lumMod val="75000"/>
+                </a:schemeClr>
+              </a:solidFill>
+              <a:latin typeface="Roboto" pitchFamily="2" charset="0"/>
+              <a:ea typeface="Roboto" pitchFamily="2" charset="0"/>
+            </a:endParaRPr>
+          </a:p>
+          <a:p>
+            <a:pPr algn="ctr">
+              <a:lnSpc>
+                <a:spcPct val="125000"/>
+              </a:lnSpc>
+            </a:pPr>
+            <a:r>
+              <a:rPr lang="en-US" sz="600" dirty="0" smtClean="0">
+                <a:solidFill>
+                  <a:schemeClr val="accent2">
+                    <a:lumMod val="75000"/>
+                  </a:schemeClr>
+                </a:solidFill>
+                <a:latin typeface="Roboto" pitchFamily="2" charset="0"/>
+                <a:ea typeface="Roboto" pitchFamily="2" charset="0"/>
+              </a:rPr>
+              <a:t>COREGISTRATION</a:t>
+            </a:r>
+          </a:p>
+          <a:p>
+            <a:pPr algn="ctr">
+              <a:lnSpc>
+                <a:spcPct val="125000"/>
+              </a:lnSpc>
+            </a:pPr>
+            <a:r>
+              <a:rPr lang="en-US" sz="600" dirty="0" smtClean="0">
+                <a:solidFill>
+                  <a:schemeClr val="accent2">
+                    <a:lumMod val="75000"/>
+                  </a:schemeClr>
+                </a:solidFill>
+                <a:latin typeface="Roboto" pitchFamily="2" charset="0"/>
+                <a:ea typeface="Roboto" pitchFamily="2" charset="0"/>
+              </a:rPr>
+              <a:t>▼</a:t>
+            </a:r>
+            <a:endParaRPr lang="en-US" sz="600" dirty="0">
+              <a:solidFill>
+                <a:schemeClr val="accent2">
+                  <a:lumMod val="75000"/>
+                </a:schemeClr>
+              </a:solidFill>
+              <a:latin typeface="Roboto" pitchFamily="2" charset="0"/>
+              <a:ea typeface="Roboto" pitchFamily="2" charset="0"/>
+            </a:endParaRPr>
+          </a:p>
+          <a:p>
+            <a:pPr algn="ctr">
+              <a:lnSpc>
+                <a:spcPct val="125000"/>
+              </a:lnSpc>
+            </a:pPr>
+            <a:r>
+              <a:rPr lang="en-US" sz="600" dirty="0" smtClean="0">
+                <a:solidFill>
+                  <a:schemeClr val="accent2">
+                    <a:lumMod val="75000"/>
+                  </a:schemeClr>
+                </a:solidFill>
+                <a:latin typeface="Roboto" pitchFamily="2" charset="0"/>
+                <a:ea typeface="Roboto" pitchFamily="2" charset="0"/>
+              </a:rPr>
+              <a:t>FILTERING</a:t>
+            </a:r>
+          </a:p>
+          <a:p>
+            <a:pPr algn="ctr">
+              <a:lnSpc>
+                <a:spcPct val="125000"/>
+              </a:lnSpc>
+            </a:pPr>
+            <a:r>
+              <a:rPr lang="en-US" sz="600" dirty="0" smtClean="0">
+                <a:solidFill>
+                  <a:schemeClr val="accent2">
+                    <a:lumMod val="75000"/>
+                  </a:schemeClr>
+                </a:solidFill>
+                <a:latin typeface="Roboto" pitchFamily="2" charset="0"/>
+                <a:ea typeface="Roboto" pitchFamily="2" charset="0"/>
+              </a:rPr>
+              <a:t>▼</a:t>
+            </a:r>
+            <a:endParaRPr lang="en-US" sz="600" dirty="0">
+              <a:solidFill>
+                <a:schemeClr val="accent2">
+                  <a:lumMod val="75000"/>
+                </a:schemeClr>
+              </a:solidFill>
+              <a:latin typeface="Roboto" pitchFamily="2" charset="0"/>
+              <a:ea typeface="Roboto" pitchFamily="2" charset="0"/>
+            </a:endParaRPr>
+          </a:p>
+          <a:p>
+            <a:pPr algn="ctr">
+              <a:lnSpc>
+                <a:spcPct val="125000"/>
+              </a:lnSpc>
+            </a:pPr>
+            <a:r>
+              <a:rPr lang="en-US" sz="600" dirty="0" smtClean="0">
+                <a:solidFill>
+                  <a:schemeClr val="accent2">
+                    <a:lumMod val="75000"/>
+                  </a:schemeClr>
+                </a:solidFill>
+                <a:latin typeface="Roboto" pitchFamily="2" charset="0"/>
+                <a:ea typeface="Roboto" pitchFamily="2" charset="0"/>
+              </a:rPr>
+              <a:t>SMOOTHING</a:t>
+            </a:r>
+          </a:p>
+        </p:txBody>
+      </p:sp>
+      <p:sp>
+        <p:nvSpPr>
+          <p:cNvPr id="4" name="ZoneTexte 3"/>
+          <p:cNvSpPr txBox="1"/>
+          <p:nvPr/>
+        </p:nvSpPr>
+        <p:spPr>
+          <a:xfrm>
+            <a:off x="68238" y="413982"/>
+            <a:ext cx="846161" cy="338554"/>
+          </a:xfrm>
+          <a:prstGeom prst="rect">
+            <a:avLst/>
+          </a:prstGeom>
+          <a:solidFill>
+            <a:schemeClr val="accent1">
+              <a:lumMod val="50000"/>
+            </a:schemeClr>
+          </a:solidFill>
+          <a:ln>
+            <a:noFill/>
+          </a:ln>
+        </p:spPr>
+        <p:txBody>
+          <a:bodyPr wrap="square" rtlCol="0">
+            <a:spAutoFit/>
+          </a:bodyPr>
+          <a:lstStyle/>
+          <a:p>
+            <a:pPr algn="ctr"/>
+            <a:r>
+              <a:rPr lang="en-US" sz="800" dirty="0" smtClean="0">
+                <a:solidFill>
+                  <a:schemeClr val="bg1"/>
+                </a:solidFill>
+                <a:latin typeface="Roboto" pitchFamily="2" charset="0"/>
+                <a:ea typeface="Roboto" pitchFamily="2" charset="0"/>
+              </a:rPr>
+              <a:t>ANATOMICAL MRI DATA</a:t>
+            </a:r>
+            <a:endParaRPr lang="en-US" sz="800" dirty="0">
+              <a:solidFill>
+                <a:schemeClr val="bg1"/>
+              </a:solidFill>
+              <a:latin typeface="Roboto" pitchFamily="2" charset="0"/>
+              <a:ea typeface="Roboto" pitchFamily="2" charset="0"/>
+            </a:endParaRPr>
+          </a:p>
+        </p:txBody>
+      </p:sp>
+      <p:sp>
+        <p:nvSpPr>
+          <p:cNvPr id="5" name="ZoneTexte 4"/>
+          <p:cNvSpPr txBox="1"/>
+          <p:nvPr/>
+        </p:nvSpPr>
+        <p:spPr>
+          <a:xfrm>
+            <a:off x="68238" y="1309419"/>
+            <a:ext cx="846161" cy="338554"/>
+          </a:xfrm>
+          <a:prstGeom prst="rect">
+            <a:avLst/>
+          </a:prstGeom>
+          <a:solidFill>
+            <a:schemeClr val="accent2"/>
+          </a:solidFill>
+          <a:ln>
+            <a:noFill/>
+          </a:ln>
+        </p:spPr>
+        <p:txBody>
+          <a:bodyPr wrap="square" rtlCol="0">
+            <a:spAutoFit/>
+          </a:bodyPr>
+          <a:lstStyle/>
+          <a:p>
+            <a:pPr algn="ctr"/>
+            <a:r>
+              <a:rPr lang="en-US" sz="800" dirty="0" smtClean="0">
+                <a:solidFill>
+                  <a:schemeClr val="bg1"/>
+                </a:solidFill>
+                <a:latin typeface="Roboto" pitchFamily="2" charset="0"/>
+                <a:ea typeface="Roboto" pitchFamily="2" charset="0"/>
+              </a:rPr>
+              <a:t>FUNCTIONAL</a:t>
+            </a:r>
+          </a:p>
+          <a:p>
+            <a:pPr algn="ctr"/>
+            <a:r>
+              <a:rPr lang="en-US" sz="800" dirty="0" smtClean="0">
+                <a:solidFill>
+                  <a:schemeClr val="bg1"/>
+                </a:solidFill>
+                <a:latin typeface="Roboto" pitchFamily="2" charset="0"/>
+                <a:ea typeface="Roboto" pitchFamily="2" charset="0"/>
+              </a:rPr>
+              <a:t>MRI DATA</a:t>
+            </a:r>
+            <a:endParaRPr lang="en-US" sz="800" dirty="0">
+              <a:solidFill>
+                <a:schemeClr val="bg1"/>
+              </a:solidFill>
+              <a:latin typeface="Roboto" pitchFamily="2" charset="0"/>
+              <a:ea typeface="Roboto" pitchFamily="2" charset="0"/>
+            </a:endParaRPr>
+          </a:p>
+        </p:txBody>
+      </p:sp>
+      <p:cxnSp>
+        <p:nvCxnSpPr>
+          <p:cNvPr id="7" name="Connecteur droit avec flèche 6"/>
+          <p:cNvCxnSpPr/>
+          <p:nvPr/>
+        </p:nvCxnSpPr>
+        <p:spPr>
+          <a:xfrm>
+            <a:off x="982638" y="578710"/>
+            <a:ext cx="252000" cy="0"/>
+          </a:xfrm>
+          <a:prstGeom prst="straightConnector1">
+            <a:avLst/>
+          </a:prstGeom>
+          <a:ln w="19050">
+            <a:solidFill>
+              <a:schemeClr val="tx2">
+                <a:lumMod val="60000"/>
+                <a:lumOff val="40000"/>
+              </a:schemeClr>
+            </a:solidFill>
+            <a:tailEnd type="triangle"/>
+          </a:ln>
+        </p:spPr>
+        <p:style>
+          <a:lnRef idx="1">
+            <a:schemeClr val="accent1"/>
+          </a:lnRef>
+          <a:fillRef idx="0">
+            <a:schemeClr val="accent1"/>
+          </a:fillRef>
+          <a:effectRef idx="0">
+            <a:schemeClr val="accent1"/>
+          </a:effectRef>
+          <a:fontRef idx="minor">
+            <a:schemeClr val="tx1"/>
+          </a:fontRef>
+        </p:style>
+      </p:cxnSp>
+      <p:cxnSp>
+        <p:nvCxnSpPr>
+          <p:cNvPr id="8" name="Connecteur droit avec flèche 7"/>
+          <p:cNvCxnSpPr/>
+          <p:nvPr/>
+        </p:nvCxnSpPr>
+        <p:spPr>
+          <a:xfrm>
+            <a:off x="2260504" y="573938"/>
+            <a:ext cx="252000" cy="0"/>
+          </a:xfrm>
+          <a:prstGeom prst="straightConnector1">
+            <a:avLst/>
+          </a:prstGeom>
+          <a:ln w="19050">
+            <a:solidFill>
+              <a:schemeClr val="tx2">
+                <a:lumMod val="60000"/>
+                <a:lumOff val="40000"/>
+              </a:schemeClr>
+            </a:solidFill>
+            <a:tailEnd type="triangle"/>
+          </a:ln>
+        </p:spPr>
+        <p:style>
+          <a:lnRef idx="1">
+            <a:schemeClr val="accent1"/>
+          </a:lnRef>
+          <a:fillRef idx="0">
+            <a:schemeClr val="accent1"/>
+          </a:fillRef>
+          <a:effectRef idx="0">
+            <a:schemeClr val="accent1"/>
+          </a:effectRef>
+          <a:fontRef idx="minor">
+            <a:schemeClr val="tx1"/>
+          </a:fontRef>
+        </p:style>
+      </p:cxnSp>
+      <p:sp>
+        <p:nvSpPr>
+          <p:cNvPr id="9" name="ZoneTexte 8"/>
+          <p:cNvSpPr txBox="1"/>
+          <p:nvPr/>
+        </p:nvSpPr>
+        <p:spPr>
+          <a:xfrm>
+            <a:off x="1359684" y="479348"/>
+            <a:ext cx="848891" cy="200055"/>
+          </a:xfrm>
+          <a:prstGeom prst="rect">
+            <a:avLst/>
+          </a:prstGeom>
+          <a:noFill/>
+          <a:ln>
+            <a:noFill/>
+          </a:ln>
+        </p:spPr>
+        <p:txBody>
+          <a:bodyPr wrap="square" rtlCol="0">
+            <a:spAutoFit/>
+          </a:bodyPr>
+          <a:lstStyle/>
+          <a:p>
+            <a:pPr algn="ctr"/>
+            <a:r>
+              <a:rPr lang="en-US" sz="700" i="1" dirty="0" smtClean="0">
+                <a:solidFill>
+                  <a:schemeClr val="accent1">
+                    <a:lumMod val="50000"/>
+                  </a:schemeClr>
+                </a:solidFill>
+                <a:latin typeface="Roboto" pitchFamily="2" charset="0"/>
+                <a:ea typeface="Roboto" pitchFamily="2" charset="0"/>
+              </a:rPr>
+              <a:t>SEGMENTATION</a:t>
+            </a:r>
+            <a:endParaRPr lang="en-US" sz="700" i="1" dirty="0">
+              <a:solidFill>
+                <a:schemeClr val="accent1">
+                  <a:lumMod val="50000"/>
+                </a:schemeClr>
+              </a:solidFill>
+              <a:latin typeface="Roboto" pitchFamily="2" charset="0"/>
+              <a:ea typeface="Roboto" pitchFamily="2" charset="0"/>
+            </a:endParaRPr>
+          </a:p>
+        </p:txBody>
+      </p:sp>
+      <p:sp>
+        <p:nvSpPr>
+          <p:cNvPr id="10" name="ZoneTexte 9"/>
+          <p:cNvSpPr txBox="1"/>
+          <p:nvPr/>
+        </p:nvSpPr>
+        <p:spPr>
+          <a:xfrm>
+            <a:off x="2637550" y="480367"/>
+            <a:ext cx="906223" cy="292388"/>
+          </a:xfrm>
+          <a:prstGeom prst="rect">
+            <a:avLst/>
+          </a:prstGeom>
+          <a:noFill/>
+          <a:ln>
+            <a:noFill/>
+          </a:ln>
+        </p:spPr>
+        <p:txBody>
+          <a:bodyPr wrap="square" rtlCol="0">
+            <a:spAutoFit/>
+          </a:bodyPr>
+          <a:lstStyle/>
+          <a:p>
+            <a:pPr algn="ctr"/>
+            <a:r>
+              <a:rPr lang="en-US" sz="700" i="1" dirty="0" smtClean="0">
+                <a:solidFill>
+                  <a:schemeClr val="accent1">
+                    <a:lumMod val="50000"/>
+                  </a:schemeClr>
+                </a:solidFill>
+                <a:latin typeface="Roboto" pitchFamily="2" charset="0"/>
+                <a:ea typeface="Roboto" pitchFamily="2" charset="0"/>
+              </a:rPr>
+              <a:t>NORMALIZATION</a:t>
+            </a:r>
+          </a:p>
+          <a:p>
+            <a:pPr algn="ctr"/>
+            <a:r>
+              <a:rPr lang="en-US" sz="600" i="1" dirty="0" smtClean="0">
+                <a:solidFill>
+                  <a:schemeClr val="accent1">
+                    <a:lumMod val="50000"/>
+                  </a:schemeClr>
+                </a:solidFill>
+                <a:latin typeface="Roboto Light" panose="02000000000000000000" pitchFamily="2" charset="0"/>
+                <a:ea typeface="Roboto Light" panose="02000000000000000000" pitchFamily="2" charset="0"/>
+              </a:rPr>
+              <a:t>ART, Dartel, FNIRT…</a:t>
+            </a:r>
+            <a:endParaRPr lang="en-US" sz="500" i="1" dirty="0">
+              <a:solidFill>
+                <a:schemeClr val="accent1">
+                  <a:lumMod val="50000"/>
+                </a:schemeClr>
+              </a:solidFill>
+              <a:latin typeface="Roboto Light" panose="02000000000000000000" pitchFamily="2" charset="0"/>
+              <a:ea typeface="Roboto Light" panose="02000000000000000000" pitchFamily="2" charset="0"/>
+            </a:endParaRPr>
+          </a:p>
+        </p:txBody>
+      </p:sp>
+      <p:sp>
+        <p:nvSpPr>
+          <p:cNvPr id="12" name="ZoneTexte 11"/>
+          <p:cNvSpPr txBox="1"/>
+          <p:nvPr/>
+        </p:nvSpPr>
+        <p:spPr>
+          <a:xfrm>
+            <a:off x="4195706" y="476235"/>
+            <a:ext cx="876711" cy="384721"/>
+          </a:xfrm>
+          <a:prstGeom prst="rect">
+            <a:avLst/>
+          </a:prstGeom>
+          <a:noFill/>
+          <a:ln>
+            <a:noFill/>
+          </a:ln>
+        </p:spPr>
+        <p:txBody>
+          <a:bodyPr wrap="square" rtlCol="0">
+            <a:spAutoFit/>
+          </a:bodyPr>
+          <a:lstStyle/>
+          <a:p>
+            <a:pPr algn="ctr"/>
+            <a:r>
+              <a:rPr lang="en-US" sz="700" i="1" dirty="0" smtClean="0">
+                <a:solidFill>
+                  <a:schemeClr val="accent1">
+                    <a:lumMod val="50000"/>
+                  </a:schemeClr>
+                </a:solidFill>
+                <a:latin typeface="Roboto" pitchFamily="2" charset="0"/>
+                <a:ea typeface="Roboto" pitchFamily="2" charset="0"/>
+              </a:rPr>
+              <a:t>PARCELLATION</a:t>
+            </a:r>
+          </a:p>
+          <a:p>
+            <a:pPr algn="ctr"/>
+            <a:r>
+              <a:rPr lang="en-US" sz="600" i="1" dirty="0" smtClean="0">
+                <a:solidFill>
+                  <a:schemeClr val="accent1">
+                    <a:lumMod val="50000"/>
+                  </a:schemeClr>
+                </a:solidFill>
+                <a:latin typeface="Roboto Light" panose="02000000000000000000" pitchFamily="2" charset="0"/>
+                <a:ea typeface="Roboto Light" panose="02000000000000000000" pitchFamily="2" charset="0"/>
+              </a:rPr>
+              <a:t>Talairach, Harvard-Oxford, AAL…</a:t>
+            </a:r>
+            <a:endParaRPr lang="en-US" sz="600" i="1" dirty="0">
+              <a:solidFill>
+                <a:schemeClr val="accent1">
+                  <a:lumMod val="50000"/>
+                </a:schemeClr>
+              </a:solidFill>
+              <a:latin typeface="Roboto Light" panose="02000000000000000000" pitchFamily="2" charset="0"/>
+              <a:ea typeface="Roboto Light" panose="02000000000000000000" pitchFamily="2" charset="0"/>
+            </a:endParaRPr>
+          </a:p>
+        </p:txBody>
+      </p:sp>
+      <p:cxnSp>
+        <p:nvCxnSpPr>
+          <p:cNvPr id="14" name="Connecteur droit avec flèche 13"/>
+          <p:cNvCxnSpPr/>
+          <p:nvPr/>
+        </p:nvCxnSpPr>
+        <p:spPr>
+          <a:xfrm>
+            <a:off x="982638" y="1474568"/>
+            <a:ext cx="252000" cy="0"/>
+          </a:xfrm>
+          <a:prstGeom prst="straightConnector1">
+            <a:avLst/>
+          </a:prstGeom>
+          <a:ln w="19050">
+            <a:solidFill>
+              <a:schemeClr val="accent2"/>
+            </a:solidFill>
+            <a:tailEnd type="triangle"/>
+          </a:ln>
+        </p:spPr>
+        <p:style>
+          <a:lnRef idx="1">
+            <a:schemeClr val="accent1"/>
+          </a:lnRef>
+          <a:fillRef idx="0">
+            <a:schemeClr val="accent1"/>
+          </a:fillRef>
+          <a:effectRef idx="0">
+            <a:schemeClr val="accent1"/>
+          </a:effectRef>
+          <a:fontRef idx="minor">
+            <a:schemeClr val="tx1"/>
+          </a:fontRef>
+        </p:style>
+      </p:cxnSp>
+      <p:cxnSp>
+        <p:nvCxnSpPr>
+          <p:cNvPr id="16" name="Connecteur droit avec flèche 15"/>
+          <p:cNvCxnSpPr/>
+          <p:nvPr/>
+        </p:nvCxnSpPr>
+        <p:spPr>
+          <a:xfrm>
+            <a:off x="3572064" y="577218"/>
+            <a:ext cx="504000" cy="0"/>
+          </a:xfrm>
+          <a:prstGeom prst="straightConnector1">
+            <a:avLst/>
+          </a:prstGeom>
+          <a:ln w="19050">
+            <a:solidFill>
+              <a:schemeClr val="tx2">
+                <a:lumMod val="60000"/>
+                <a:lumOff val="40000"/>
+              </a:schemeClr>
+            </a:solidFill>
+            <a:tailEnd type="triangle"/>
+          </a:ln>
+        </p:spPr>
+        <p:style>
+          <a:lnRef idx="1">
+            <a:schemeClr val="accent1"/>
+          </a:lnRef>
+          <a:fillRef idx="0">
+            <a:schemeClr val="accent1"/>
+          </a:fillRef>
+          <a:effectRef idx="0">
+            <a:schemeClr val="accent1"/>
+          </a:effectRef>
+          <a:fontRef idx="minor">
+            <a:schemeClr val="tx1"/>
+          </a:fontRef>
+        </p:style>
+      </p:cxnSp>
+      <p:sp>
+        <p:nvSpPr>
+          <p:cNvPr id="17" name="ZoneTexte 16"/>
+          <p:cNvSpPr txBox="1"/>
+          <p:nvPr/>
+        </p:nvSpPr>
+        <p:spPr>
+          <a:xfrm>
+            <a:off x="1331913" y="1047836"/>
+            <a:ext cx="888123" cy="200055"/>
+          </a:xfrm>
+          <a:prstGeom prst="rect">
+            <a:avLst/>
+          </a:prstGeom>
+          <a:solidFill>
+            <a:schemeClr val="accent2"/>
+          </a:solidFill>
+          <a:ln>
+            <a:noFill/>
+          </a:ln>
+        </p:spPr>
+        <p:txBody>
+          <a:bodyPr wrap="square" rtlCol="0">
+            <a:spAutoFit/>
+          </a:bodyPr>
+          <a:lstStyle/>
+          <a:p>
+            <a:pPr algn="ctr"/>
+            <a:r>
+              <a:rPr lang="en-US" sz="700" i="1" dirty="0" smtClean="0">
+                <a:solidFill>
+                  <a:schemeClr val="bg1"/>
+                </a:solidFill>
+                <a:latin typeface="Roboto" pitchFamily="2" charset="0"/>
+                <a:ea typeface="Roboto" pitchFamily="2" charset="0"/>
+              </a:rPr>
+              <a:t>PREPROCESSING</a:t>
+            </a:r>
+            <a:endParaRPr lang="en-US" sz="700" i="1" dirty="0">
+              <a:solidFill>
+                <a:schemeClr val="bg1"/>
+              </a:solidFill>
+              <a:latin typeface="Roboto" pitchFamily="2" charset="0"/>
+              <a:ea typeface="Roboto" pitchFamily="2" charset="0"/>
+            </a:endParaRPr>
+          </a:p>
+        </p:txBody>
+      </p:sp>
+      <p:cxnSp>
+        <p:nvCxnSpPr>
+          <p:cNvPr id="18" name="Connecteur droit avec flèche 17"/>
+          <p:cNvCxnSpPr/>
+          <p:nvPr/>
+        </p:nvCxnSpPr>
+        <p:spPr>
+          <a:xfrm>
+            <a:off x="2266950" y="1474568"/>
+            <a:ext cx="252000" cy="0"/>
+          </a:xfrm>
+          <a:prstGeom prst="straightConnector1">
+            <a:avLst/>
+          </a:prstGeom>
+          <a:ln w="19050">
+            <a:solidFill>
+              <a:schemeClr val="accent2"/>
+            </a:solidFill>
+            <a:tailEnd type="triangle"/>
+          </a:ln>
+        </p:spPr>
+        <p:style>
+          <a:lnRef idx="1">
+            <a:schemeClr val="accent1"/>
+          </a:lnRef>
+          <a:fillRef idx="0">
+            <a:schemeClr val="accent1"/>
+          </a:fillRef>
+          <a:effectRef idx="0">
+            <a:schemeClr val="accent1"/>
+          </a:effectRef>
+          <a:fontRef idx="minor">
+            <a:schemeClr val="tx1"/>
+          </a:fontRef>
+        </p:style>
+      </p:cxnSp>
+      <p:sp>
+        <p:nvSpPr>
+          <p:cNvPr id="20" name="ZoneTexte 19"/>
+          <p:cNvSpPr txBox="1"/>
+          <p:nvPr/>
+        </p:nvSpPr>
+        <p:spPr>
+          <a:xfrm>
+            <a:off x="2637550" y="1047836"/>
+            <a:ext cx="888123" cy="1231106"/>
+          </a:xfrm>
+          <a:prstGeom prst="rect">
+            <a:avLst/>
+          </a:prstGeom>
+          <a:noFill/>
+          <a:ln>
+            <a:solidFill>
+              <a:schemeClr val="accent2"/>
+            </a:solidFill>
+          </a:ln>
+        </p:spPr>
+        <p:txBody>
+          <a:bodyPr wrap="square" rtlCol="0">
+            <a:spAutoFit/>
+          </a:bodyPr>
+          <a:lstStyle/>
+          <a:p>
+            <a:pPr algn="ctr">
+              <a:lnSpc>
+                <a:spcPct val="150000"/>
+              </a:lnSpc>
+            </a:pPr>
+            <a:endParaRPr lang="en-US" sz="600" i="1" dirty="0" smtClean="0">
+              <a:solidFill>
+                <a:schemeClr val="accent2">
+                  <a:lumMod val="75000"/>
+                </a:schemeClr>
+              </a:solidFill>
+              <a:latin typeface="Roboto" pitchFamily="2" charset="0"/>
+              <a:ea typeface="Roboto" pitchFamily="2" charset="0"/>
+            </a:endParaRPr>
+          </a:p>
+          <a:p>
+            <a:pPr algn="ctr">
+              <a:lnSpc>
+                <a:spcPct val="125000"/>
+              </a:lnSpc>
+              <a:spcBef>
+                <a:spcPts val="600"/>
+              </a:spcBef>
+            </a:pPr>
+            <a:r>
+              <a:rPr lang="en-US" sz="600" dirty="0" smtClean="0">
+                <a:solidFill>
+                  <a:schemeClr val="accent2">
+                    <a:lumMod val="75000"/>
+                  </a:schemeClr>
+                </a:solidFill>
+                <a:latin typeface="Roboto" pitchFamily="2" charset="0"/>
+                <a:ea typeface="Roboto" pitchFamily="2" charset="0"/>
+              </a:rPr>
+              <a:t>GENERAL LINEAR MODEL</a:t>
+            </a:r>
+          </a:p>
+          <a:p>
+            <a:pPr algn="ctr">
+              <a:lnSpc>
+                <a:spcPct val="125000"/>
+              </a:lnSpc>
+            </a:pPr>
+            <a:r>
+              <a:rPr lang="en-US" sz="600" dirty="0" smtClean="0">
+                <a:solidFill>
+                  <a:schemeClr val="accent2">
+                    <a:lumMod val="75000"/>
+                  </a:schemeClr>
+                </a:solidFill>
+                <a:latin typeface="Roboto" pitchFamily="2" charset="0"/>
+                <a:ea typeface="Roboto" pitchFamily="2" charset="0"/>
+              </a:rPr>
+              <a:t>▼</a:t>
+            </a:r>
+            <a:endParaRPr lang="en-US" sz="600" dirty="0">
+              <a:solidFill>
+                <a:schemeClr val="accent2">
+                  <a:lumMod val="75000"/>
+                </a:schemeClr>
+              </a:solidFill>
+              <a:latin typeface="Roboto" pitchFamily="2" charset="0"/>
+              <a:ea typeface="Roboto" pitchFamily="2" charset="0"/>
+            </a:endParaRPr>
+          </a:p>
+          <a:p>
+            <a:pPr algn="ctr">
+              <a:lnSpc>
+                <a:spcPct val="125000"/>
+              </a:lnSpc>
+            </a:pPr>
+            <a:r>
+              <a:rPr lang="en-US" sz="600" dirty="0" smtClean="0">
+                <a:solidFill>
+                  <a:schemeClr val="accent2">
+                    <a:lumMod val="75000"/>
+                  </a:schemeClr>
+                </a:solidFill>
+                <a:latin typeface="Roboto" pitchFamily="2" charset="0"/>
+                <a:ea typeface="Roboto" pitchFamily="2" charset="0"/>
+              </a:rPr>
+              <a:t>STATISTIC</a:t>
+            </a:r>
+          </a:p>
+          <a:p>
+            <a:pPr algn="ctr">
+              <a:lnSpc>
+                <a:spcPct val="125000"/>
+              </a:lnSpc>
+            </a:pPr>
+            <a:r>
+              <a:rPr lang="en-US" sz="600" dirty="0" smtClean="0">
+                <a:solidFill>
+                  <a:schemeClr val="accent2">
+                    <a:lumMod val="75000"/>
+                  </a:schemeClr>
+                </a:solidFill>
+                <a:latin typeface="Roboto" pitchFamily="2" charset="0"/>
+                <a:ea typeface="Roboto" pitchFamily="2" charset="0"/>
+              </a:rPr>
+              <a:t>▼</a:t>
+            </a:r>
+            <a:endParaRPr lang="en-US" sz="600" dirty="0">
+              <a:solidFill>
+                <a:schemeClr val="accent2">
+                  <a:lumMod val="75000"/>
+                </a:schemeClr>
+              </a:solidFill>
+              <a:latin typeface="Roboto" pitchFamily="2" charset="0"/>
+              <a:ea typeface="Roboto" pitchFamily="2" charset="0"/>
+            </a:endParaRPr>
+          </a:p>
+          <a:p>
+            <a:pPr algn="ctr">
+              <a:lnSpc>
+                <a:spcPct val="125000"/>
+              </a:lnSpc>
+            </a:pPr>
+            <a:r>
+              <a:rPr lang="en-US" sz="600" dirty="0" smtClean="0">
+                <a:solidFill>
+                  <a:schemeClr val="accent2">
+                    <a:lumMod val="75000"/>
+                  </a:schemeClr>
+                </a:solidFill>
+                <a:latin typeface="Roboto" pitchFamily="2" charset="0"/>
+                <a:ea typeface="Roboto" pitchFamily="2" charset="0"/>
+              </a:rPr>
+              <a:t>THRESHOLDING</a:t>
+            </a:r>
+          </a:p>
+          <a:p>
+            <a:pPr algn="ctr"/>
+            <a:r>
+              <a:rPr lang="en-US" sz="500" i="1" dirty="0" smtClean="0">
+                <a:solidFill>
+                  <a:schemeClr val="accent2">
+                    <a:lumMod val="75000"/>
+                  </a:schemeClr>
+                </a:solidFill>
+                <a:latin typeface="Roboto Light" panose="02000000000000000000" pitchFamily="2" charset="0"/>
+                <a:ea typeface="Roboto Light" panose="02000000000000000000" pitchFamily="2" charset="0"/>
+              </a:rPr>
+              <a:t>Random Gaussian fields, Monte-Carlo, permutation-based…</a:t>
+            </a:r>
+          </a:p>
+        </p:txBody>
+      </p:sp>
+      <p:sp>
+        <p:nvSpPr>
+          <p:cNvPr id="21" name="ZoneTexte 20"/>
+          <p:cNvSpPr txBox="1"/>
+          <p:nvPr/>
+        </p:nvSpPr>
+        <p:spPr>
+          <a:xfrm>
+            <a:off x="2637550" y="1047836"/>
+            <a:ext cx="888123" cy="200055"/>
+          </a:xfrm>
+          <a:prstGeom prst="rect">
+            <a:avLst/>
+          </a:prstGeom>
+          <a:solidFill>
+            <a:schemeClr val="accent2"/>
+          </a:solidFill>
+          <a:ln>
+            <a:noFill/>
+          </a:ln>
+        </p:spPr>
+        <p:txBody>
+          <a:bodyPr wrap="square" rtlCol="0">
+            <a:spAutoFit/>
+          </a:bodyPr>
+          <a:lstStyle/>
+          <a:p>
+            <a:pPr algn="ctr"/>
+            <a:r>
+              <a:rPr lang="en-US" sz="700" i="1" dirty="0" smtClean="0">
+                <a:solidFill>
+                  <a:schemeClr val="bg1"/>
+                </a:solidFill>
+                <a:latin typeface="Roboto" pitchFamily="2" charset="0"/>
+                <a:ea typeface="Roboto" pitchFamily="2" charset="0"/>
+              </a:rPr>
+              <a:t>ACTIVATION</a:t>
+            </a:r>
+            <a:endParaRPr lang="en-US" sz="700" i="1" dirty="0">
+              <a:solidFill>
+                <a:schemeClr val="bg1"/>
+              </a:solidFill>
+              <a:latin typeface="Roboto" pitchFamily="2" charset="0"/>
+              <a:ea typeface="Roboto" pitchFamily="2" charset="0"/>
+            </a:endParaRPr>
+          </a:p>
+        </p:txBody>
+      </p:sp>
+      <p:grpSp>
+        <p:nvGrpSpPr>
+          <p:cNvPr id="30" name="Groupe 29"/>
+          <p:cNvGrpSpPr/>
+          <p:nvPr/>
+        </p:nvGrpSpPr>
+        <p:grpSpPr>
+          <a:xfrm>
+            <a:off x="3743438" y="1047836"/>
+            <a:ext cx="1828621" cy="1187505"/>
+            <a:chOff x="3743438" y="1009932"/>
+            <a:chExt cx="1828621" cy="1187505"/>
+          </a:xfrm>
+        </p:grpSpPr>
+        <p:sp>
+          <p:nvSpPr>
+            <p:cNvPr id="26" name="ZoneTexte 25"/>
+            <p:cNvSpPr txBox="1"/>
+            <p:nvPr/>
+          </p:nvSpPr>
+          <p:spPr>
+            <a:xfrm>
+              <a:off x="3743438" y="1009932"/>
+              <a:ext cx="889200" cy="1187505"/>
+            </a:xfrm>
+            <a:prstGeom prst="rect">
+              <a:avLst/>
+            </a:prstGeom>
+            <a:noFill/>
+            <a:ln>
+              <a:solidFill>
+                <a:schemeClr val="tx1">
+                  <a:lumMod val="75000"/>
+                  <a:lumOff val="25000"/>
+                </a:schemeClr>
+              </a:solidFill>
+            </a:ln>
+          </p:spPr>
+          <p:txBody>
+            <a:bodyPr wrap="square" numCol="1" rtlCol="0">
+              <a:spAutoFit/>
+            </a:bodyPr>
+            <a:lstStyle/>
+            <a:p>
+              <a:pPr algn="ctr">
+                <a:lnSpc>
+                  <a:spcPct val="150000"/>
+                </a:lnSpc>
+              </a:pPr>
+              <a:endParaRPr lang="en-US" sz="600" i="1" dirty="0" smtClean="0">
+                <a:solidFill>
+                  <a:srgbClr val="C00000"/>
+                </a:solidFill>
+                <a:latin typeface="Roboto" pitchFamily="2" charset="0"/>
+                <a:ea typeface="Roboto" pitchFamily="2" charset="0"/>
+              </a:endParaRPr>
+            </a:p>
+            <a:p>
+              <a:pPr algn="ctr">
+                <a:lnSpc>
+                  <a:spcPct val="150000"/>
+                </a:lnSpc>
+              </a:pPr>
+              <a:r>
+                <a:rPr lang="en-US" sz="700" dirty="0" smtClean="0">
+                  <a:solidFill>
+                    <a:srgbClr val="C00000"/>
+                  </a:solidFill>
+                  <a:latin typeface="Roboto" pitchFamily="2" charset="0"/>
+                  <a:ea typeface="Roboto" pitchFamily="2" charset="0"/>
+                </a:rPr>
+                <a:t>ICA</a:t>
+              </a:r>
+            </a:p>
+            <a:p>
+              <a:pPr algn="ctr">
+                <a:lnSpc>
+                  <a:spcPct val="125000"/>
+                </a:lnSpc>
+                <a:spcAft>
+                  <a:spcPts val="800"/>
+                </a:spcAft>
+              </a:pPr>
+              <a:r>
+                <a:rPr lang="en-US" sz="600" dirty="0" smtClean="0">
+                  <a:solidFill>
+                    <a:schemeClr val="tx1">
+                      <a:lumMod val="75000"/>
+                      <a:lumOff val="25000"/>
+                    </a:schemeClr>
+                  </a:solidFill>
+                  <a:latin typeface="Roboto" pitchFamily="2" charset="0"/>
+                  <a:ea typeface="Roboto" pitchFamily="2" charset="0"/>
+                </a:rPr>
+                <a:t>ICA</a:t>
+              </a:r>
+            </a:p>
+            <a:p>
+              <a:pPr algn="ctr">
+                <a:lnSpc>
+                  <a:spcPct val="125000"/>
+                </a:lnSpc>
+              </a:pPr>
+              <a:r>
+                <a:rPr lang="en-US" sz="600" dirty="0" smtClean="0">
+                  <a:solidFill>
+                    <a:schemeClr val="tx1">
+                      <a:lumMod val="75000"/>
+                      <a:lumOff val="25000"/>
+                    </a:schemeClr>
+                  </a:solidFill>
+                  <a:latin typeface="Roboto" pitchFamily="2" charset="0"/>
+                  <a:ea typeface="Roboto" pitchFamily="2" charset="0"/>
+                </a:rPr>
                 <a:t>SEED-BASED</a:t>
               </a:r>
+            </a:p>
+            <a:p>
+              <a:pPr algn="ctr">
+                <a:lnSpc>
+                  <a:spcPct val="125000"/>
+                </a:lnSpc>
+              </a:pPr>
+              <a:r>
+                <a:rPr lang="en-US" sz="500" dirty="0" smtClean="0">
+                  <a:solidFill>
+                    <a:schemeClr val="tx1">
+                      <a:lumMod val="75000"/>
+                      <a:lumOff val="25000"/>
+                    </a:schemeClr>
+                  </a:solidFill>
+                  <a:latin typeface="Roboto Light" panose="02000000000000000000" pitchFamily="2" charset="0"/>
+                  <a:ea typeface="Roboto Light" panose="02000000000000000000" pitchFamily="2" charset="0"/>
+                </a:rPr>
+                <a:t>Voxel-to-voxel</a:t>
+              </a:r>
+            </a:p>
+            <a:p>
+              <a:pPr algn="ctr">
+                <a:lnSpc>
+                  <a:spcPct val="125000"/>
+                </a:lnSpc>
+                <a:spcAft>
+                  <a:spcPts val="1200"/>
+                </a:spcAft>
+              </a:pPr>
+              <a:r>
+                <a:rPr lang="en-US" sz="500" dirty="0" smtClean="0">
+                  <a:solidFill>
+                    <a:schemeClr val="tx1">
+                      <a:lumMod val="75000"/>
+                      <a:lumOff val="25000"/>
+                    </a:schemeClr>
+                  </a:solidFill>
+                  <a:latin typeface="Roboto Light" panose="02000000000000000000" pitchFamily="2" charset="0"/>
+                  <a:ea typeface="Roboto Light" panose="02000000000000000000" pitchFamily="2" charset="0"/>
+                </a:rPr>
+                <a:t>ROI-to-ROI</a:t>
+              </a:r>
+              <a:endParaRPr lang="en-US" sz="500" dirty="0" smtClean="0">
+                <a:solidFill>
+                  <a:schemeClr val="tx1">
+                    <a:lumMod val="75000"/>
+                    <a:lumOff val="25000"/>
+                  </a:schemeClr>
+                </a:solidFill>
+                <a:latin typeface="Roboto Light" panose="02000000000000000000" pitchFamily="2" charset="0"/>
+                <a:ea typeface="Roboto Light" panose="02000000000000000000" pitchFamily="2" charset="0"/>
+              </a:endParaRPr>
             </a:p>
             <a:p>
               <a:pPr algn="ctr">
@@ -4736,1511 +6328,6 @@
     <p:extLst>
       <p:ext uri="{BB962C8B-B14F-4D97-AF65-F5344CB8AC3E}">
         <p14:creationId xmlns:p14="http://schemas.microsoft.com/office/powerpoint/2010/main" val="2176508357"/>
-      </p:ext>
-    </p:extLst>
-  </p:cSld>
-  <p:clrMapOvr>
-    <a:masterClrMapping/>
-  </p:clrMapOvr>
-</p:sld>
-</file>
-
-<file path=ppt/slides/slide2.xml><?xml version="1.0" encoding="utf-8"?>
-<p:sld xmlns:a="http://schemas.openxmlformats.org/drawingml/2006/main" xmlns:r="http://schemas.openxmlformats.org/officeDocument/2006/relationships" xmlns:p="http://schemas.openxmlformats.org/presentationml/2006/main">
-  <p:cSld>
-    <p:spTree>
-      <p:nvGrpSpPr>
-        <p:cNvPr id="1" name=""/>
-        <p:cNvGrpSpPr/>
-        <p:nvPr/>
-      </p:nvGrpSpPr>
-      <p:grpSpPr>
-        <a:xfrm>
-          <a:off x="0" y="0"/>
-          <a:ext cx="0" cy="0"/>
-          <a:chOff x="0" y="0"/>
-          <a:chExt cx="0" cy="0"/>
-        </a:xfrm>
-      </p:grpSpPr>
-      <p:cxnSp>
-        <p:nvCxnSpPr>
-          <p:cNvPr id="37" name="Connecteur en angle 36"/>
-          <p:cNvCxnSpPr/>
-          <p:nvPr/>
-        </p:nvCxnSpPr>
-        <p:spPr>
-          <a:xfrm rot="16200000" flipH="1">
-            <a:off x="2992225" y="1054656"/>
-            <a:ext cx="144000" cy="2580015"/>
-          </a:xfrm>
-          <a:prstGeom prst="bentConnector2">
-            <a:avLst/>
-          </a:prstGeom>
-          <a:ln w="9525">
-            <a:solidFill>
-              <a:schemeClr val="tx1">
-                <a:lumMod val="65000"/>
-                <a:lumOff val="35000"/>
-              </a:schemeClr>
-            </a:solidFill>
-            <a:prstDash val="solid"/>
-            <a:headEnd type="none" w="med" len="med"/>
-            <a:tailEnd type="none" w="med" len="med"/>
-          </a:ln>
-        </p:spPr>
-        <p:style>
-          <a:lnRef idx="1">
-            <a:schemeClr val="dk1"/>
-          </a:lnRef>
-          <a:fillRef idx="0">
-            <a:schemeClr val="dk1"/>
-          </a:fillRef>
-          <a:effectRef idx="0">
-            <a:schemeClr val="dk1"/>
-          </a:effectRef>
-          <a:fontRef idx="minor">
-            <a:schemeClr val="tx1"/>
-          </a:fontRef>
-        </p:style>
-      </p:cxnSp>
-      <p:cxnSp>
-        <p:nvCxnSpPr>
-          <p:cNvPr id="38" name="Connecteur droit avec flèche 37"/>
-          <p:cNvCxnSpPr/>
-          <p:nvPr/>
-        </p:nvCxnSpPr>
-        <p:spPr>
-          <a:xfrm rot="16200000">
-            <a:off x="4282233" y="2350942"/>
-            <a:ext cx="144000" cy="0"/>
-          </a:xfrm>
-          <a:prstGeom prst="straightConnector1">
-            <a:avLst/>
-          </a:prstGeom>
-          <a:ln w="9525">
-            <a:solidFill>
-              <a:schemeClr val="tx1">
-                <a:lumMod val="65000"/>
-                <a:lumOff val="35000"/>
-              </a:schemeClr>
-            </a:solidFill>
-            <a:prstDash val="solid"/>
-            <a:tailEnd type="triangle"/>
-          </a:ln>
-        </p:spPr>
-        <p:style>
-          <a:lnRef idx="1">
-            <a:schemeClr val="accent1"/>
-          </a:lnRef>
-          <a:fillRef idx="0">
-            <a:schemeClr val="accent1"/>
-          </a:fillRef>
-          <a:effectRef idx="0">
-            <a:schemeClr val="accent1"/>
-          </a:effectRef>
-          <a:fontRef idx="minor">
-            <a:schemeClr val="tx1"/>
-          </a:fontRef>
-        </p:style>
-      </p:cxnSp>
-      <p:sp>
-        <p:nvSpPr>
-          <p:cNvPr id="19" name="ZoneTexte 18"/>
-          <p:cNvSpPr txBox="1"/>
-          <p:nvPr/>
-        </p:nvSpPr>
-        <p:spPr>
-          <a:xfrm>
-            <a:off x="1331913" y="1047836"/>
-            <a:ext cx="888123" cy="1221488"/>
-          </a:xfrm>
-          <a:prstGeom prst="rect">
-            <a:avLst/>
-          </a:prstGeom>
-          <a:noFill/>
-          <a:ln>
-            <a:solidFill>
-              <a:schemeClr val="accent2"/>
-            </a:solidFill>
-          </a:ln>
-        </p:spPr>
-        <p:txBody>
-          <a:bodyPr wrap="square" rtlCol="0">
-            <a:spAutoFit/>
-          </a:bodyPr>
-          <a:lstStyle/>
-          <a:p>
-            <a:pPr algn="ctr">
-              <a:lnSpc>
-                <a:spcPct val="150000"/>
-              </a:lnSpc>
-            </a:pPr>
-            <a:endParaRPr lang="en-US" sz="600" i="1" dirty="0" smtClean="0">
-              <a:solidFill>
-                <a:schemeClr val="accent2">
-                  <a:lumMod val="75000"/>
-                </a:schemeClr>
-              </a:solidFill>
-              <a:latin typeface="Roboto" pitchFamily="2" charset="0"/>
-              <a:ea typeface="Roboto" pitchFamily="2" charset="0"/>
-            </a:endParaRPr>
-          </a:p>
-          <a:p>
-            <a:pPr algn="ctr">
-              <a:lnSpc>
-                <a:spcPct val="125000"/>
-              </a:lnSpc>
-              <a:spcBef>
-                <a:spcPts val="600"/>
-              </a:spcBef>
-            </a:pPr>
-            <a:r>
-              <a:rPr lang="en-US" sz="600" dirty="0" smtClean="0">
-                <a:solidFill>
-                  <a:schemeClr val="accent2">
-                    <a:lumMod val="75000"/>
-                  </a:schemeClr>
-                </a:solidFill>
-                <a:latin typeface="Roboto" pitchFamily="2" charset="0"/>
-                <a:ea typeface="Roboto" pitchFamily="2" charset="0"/>
-              </a:rPr>
-              <a:t>SLICE TIMING CORRECTION</a:t>
-            </a:r>
-          </a:p>
-          <a:p>
-            <a:pPr algn="ctr">
-              <a:lnSpc>
-                <a:spcPct val="125000"/>
-              </a:lnSpc>
-            </a:pPr>
-            <a:r>
-              <a:rPr lang="en-US" sz="600" dirty="0" smtClean="0">
-                <a:solidFill>
-                  <a:schemeClr val="accent2">
-                    <a:lumMod val="75000"/>
-                  </a:schemeClr>
-                </a:solidFill>
-                <a:latin typeface="Roboto" pitchFamily="2" charset="0"/>
-                <a:ea typeface="Roboto" pitchFamily="2" charset="0"/>
-              </a:rPr>
-              <a:t>▼</a:t>
-            </a:r>
-            <a:endParaRPr lang="en-US" sz="600" dirty="0">
-              <a:solidFill>
-                <a:schemeClr val="accent2">
-                  <a:lumMod val="75000"/>
-                </a:schemeClr>
-              </a:solidFill>
-              <a:latin typeface="Roboto" pitchFamily="2" charset="0"/>
-              <a:ea typeface="Roboto" pitchFamily="2" charset="0"/>
-            </a:endParaRPr>
-          </a:p>
-          <a:p>
-            <a:pPr algn="ctr">
-              <a:lnSpc>
-                <a:spcPct val="125000"/>
-              </a:lnSpc>
-            </a:pPr>
-            <a:r>
-              <a:rPr lang="en-US" sz="600" dirty="0" smtClean="0">
-                <a:solidFill>
-                  <a:schemeClr val="accent2">
-                    <a:lumMod val="75000"/>
-                  </a:schemeClr>
-                </a:solidFill>
-                <a:latin typeface="Roboto" pitchFamily="2" charset="0"/>
-                <a:ea typeface="Roboto" pitchFamily="2" charset="0"/>
-              </a:rPr>
-              <a:t>COREGISTRATION</a:t>
-            </a:r>
-          </a:p>
-          <a:p>
-            <a:pPr algn="ctr">
-              <a:lnSpc>
-                <a:spcPct val="125000"/>
-              </a:lnSpc>
-            </a:pPr>
-            <a:r>
-              <a:rPr lang="en-US" sz="600" dirty="0" smtClean="0">
-                <a:solidFill>
-                  <a:schemeClr val="accent2">
-                    <a:lumMod val="75000"/>
-                  </a:schemeClr>
-                </a:solidFill>
-                <a:latin typeface="Roboto" pitchFamily="2" charset="0"/>
-                <a:ea typeface="Roboto" pitchFamily="2" charset="0"/>
-              </a:rPr>
-              <a:t>▼</a:t>
-            </a:r>
-            <a:endParaRPr lang="en-US" sz="600" dirty="0">
-              <a:solidFill>
-                <a:schemeClr val="accent2">
-                  <a:lumMod val="75000"/>
-                </a:schemeClr>
-              </a:solidFill>
-              <a:latin typeface="Roboto" pitchFamily="2" charset="0"/>
-              <a:ea typeface="Roboto" pitchFamily="2" charset="0"/>
-            </a:endParaRPr>
-          </a:p>
-          <a:p>
-            <a:pPr algn="ctr">
-              <a:lnSpc>
-                <a:spcPct val="125000"/>
-              </a:lnSpc>
-            </a:pPr>
-            <a:r>
-              <a:rPr lang="en-US" sz="600" dirty="0" smtClean="0">
-                <a:solidFill>
-                  <a:schemeClr val="accent2">
-                    <a:lumMod val="75000"/>
-                  </a:schemeClr>
-                </a:solidFill>
-                <a:latin typeface="Roboto" pitchFamily="2" charset="0"/>
-                <a:ea typeface="Roboto" pitchFamily="2" charset="0"/>
-              </a:rPr>
-              <a:t>FILTERING</a:t>
-            </a:r>
-          </a:p>
-          <a:p>
-            <a:pPr algn="ctr">
-              <a:lnSpc>
-                <a:spcPct val="125000"/>
-              </a:lnSpc>
-            </a:pPr>
-            <a:r>
-              <a:rPr lang="en-US" sz="600" dirty="0" smtClean="0">
-                <a:solidFill>
-                  <a:schemeClr val="accent2">
-                    <a:lumMod val="75000"/>
-                  </a:schemeClr>
-                </a:solidFill>
-                <a:latin typeface="Roboto" pitchFamily="2" charset="0"/>
-                <a:ea typeface="Roboto" pitchFamily="2" charset="0"/>
-              </a:rPr>
-              <a:t>▼</a:t>
-            </a:r>
-            <a:endParaRPr lang="en-US" sz="600" dirty="0">
-              <a:solidFill>
-                <a:schemeClr val="accent2">
-                  <a:lumMod val="75000"/>
-                </a:schemeClr>
-              </a:solidFill>
-              <a:latin typeface="Roboto" pitchFamily="2" charset="0"/>
-              <a:ea typeface="Roboto" pitchFamily="2" charset="0"/>
-            </a:endParaRPr>
-          </a:p>
-          <a:p>
-            <a:pPr algn="ctr">
-              <a:lnSpc>
-                <a:spcPct val="125000"/>
-              </a:lnSpc>
-            </a:pPr>
-            <a:r>
-              <a:rPr lang="en-US" sz="600" dirty="0" smtClean="0">
-                <a:solidFill>
-                  <a:schemeClr val="accent2">
-                    <a:lumMod val="75000"/>
-                  </a:schemeClr>
-                </a:solidFill>
-                <a:latin typeface="Roboto" pitchFamily="2" charset="0"/>
-                <a:ea typeface="Roboto" pitchFamily="2" charset="0"/>
-              </a:rPr>
-              <a:t>SMOOTHING</a:t>
-            </a:r>
-          </a:p>
-        </p:txBody>
-      </p:sp>
-      <p:sp>
-        <p:nvSpPr>
-          <p:cNvPr id="4" name="ZoneTexte 3"/>
-          <p:cNvSpPr txBox="1"/>
-          <p:nvPr/>
-        </p:nvSpPr>
-        <p:spPr>
-          <a:xfrm>
-            <a:off x="68238" y="413982"/>
-            <a:ext cx="846161" cy="338554"/>
-          </a:xfrm>
-          <a:prstGeom prst="rect">
-            <a:avLst/>
-          </a:prstGeom>
-          <a:solidFill>
-            <a:schemeClr val="accent1">
-              <a:lumMod val="50000"/>
-            </a:schemeClr>
-          </a:solidFill>
-          <a:ln>
-            <a:noFill/>
-          </a:ln>
-        </p:spPr>
-        <p:txBody>
-          <a:bodyPr wrap="square" rtlCol="0">
-            <a:spAutoFit/>
-          </a:bodyPr>
-          <a:lstStyle/>
-          <a:p>
-            <a:pPr algn="ctr"/>
-            <a:r>
-              <a:rPr lang="en-US" sz="800" dirty="0" smtClean="0">
-                <a:solidFill>
-                  <a:schemeClr val="bg1"/>
-                </a:solidFill>
-                <a:latin typeface="Roboto" pitchFamily="2" charset="0"/>
-                <a:ea typeface="Roboto" pitchFamily="2" charset="0"/>
-              </a:rPr>
-              <a:t>ANATOMICAL MRI DATA</a:t>
-            </a:r>
-            <a:endParaRPr lang="en-US" sz="800" dirty="0">
-              <a:solidFill>
-                <a:schemeClr val="bg1"/>
-              </a:solidFill>
-              <a:latin typeface="Roboto" pitchFamily="2" charset="0"/>
-              <a:ea typeface="Roboto" pitchFamily="2" charset="0"/>
-            </a:endParaRPr>
-          </a:p>
-        </p:txBody>
-      </p:sp>
-      <p:sp>
-        <p:nvSpPr>
-          <p:cNvPr id="5" name="ZoneTexte 4"/>
-          <p:cNvSpPr txBox="1"/>
-          <p:nvPr/>
-        </p:nvSpPr>
-        <p:spPr>
-          <a:xfrm>
-            <a:off x="68238" y="1309419"/>
-            <a:ext cx="846161" cy="338554"/>
-          </a:xfrm>
-          <a:prstGeom prst="rect">
-            <a:avLst/>
-          </a:prstGeom>
-          <a:solidFill>
-            <a:schemeClr val="accent2"/>
-          </a:solidFill>
-          <a:ln>
-            <a:noFill/>
-          </a:ln>
-        </p:spPr>
-        <p:txBody>
-          <a:bodyPr wrap="square" rtlCol="0">
-            <a:spAutoFit/>
-          </a:bodyPr>
-          <a:lstStyle/>
-          <a:p>
-            <a:pPr algn="ctr"/>
-            <a:r>
-              <a:rPr lang="en-US" sz="800" dirty="0" smtClean="0">
-                <a:solidFill>
-                  <a:schemeClr val="bg1"/>
-                </a:solidFill>
-                <a:latin typeface="Roboto" pitchFamily="2" charset="0"/>
-                <a:ea typeface="Roboto" pitchFamily="2" charset="0"/>
-              </a:rPr>
-              <a:t>FUNCTIONAL</a:t>
-            </a:r>
-          </a:p>
-          <a:p>
-            <a:pPr algn="ctr"/>
-            <a:r>
-              <a:rPr lang="en-US" sz="800" dirty="0" smtClean="0">
-                <a:solidFill>
-                  <a:schemeClr val="bg1"/>
-                </a:solidFill>
-                <a:latin typeface="Roboto" pitchFamily="2" charset="0"/>
-                <a:ea typeface="Roboto" pitchFamily="2" charset="0"/>
-              </a:rPr>
-              <a:t>MRI DATA</a:t>
-            </a:r>
-            <a:endParaRPr lang="en-US" sz="800" dirty="0">
-              <a:solidFill>
-                <a:schemeClr val="bg1"/>
-              </a:solidFill>
-              <a:latin typeface="Roboto" pitchFamily="2" charset="0"/>
-              <a:ea typeface="Roboto" pitchFamily="2" charset="0"/>
-            </a:endParaRPr>
-          </a:p>
-        </p:txBody>
-      </p:sp>
-      <p:cxnSp>
-        <p:nvCxnSpPr>
-          <p:cNvPr id="7" name="Connecteur droit avec flèche 6"/>
-          <p:cNvCxnSpPr/>
-          <p:nvPr/>
-        </p:nvCxnSpPr>
-        <p:spPr>
-          <a:xfrm>
-            <a:off x="982638" y="578710"/>
-            <a:ext cx="252000" cy="0"/>
-          </a:xfrm>
-          <a:prstGeom prst="straightConnector1">
-            <a:avLst/>
-          </a:prstGeom>
-          <a:ln w="19050">
-            <a:solidFill>
-              <a:schemeClr val="tx2">
-                <a:lumMod val="60000"/>
-                <a:lumOff val="40000"/>
-              </a:schemeClr>
-            </a:solidFill>
-            <a:tailEnd type="triangle"/>
-          </a:ln>
-        </p:spPr>
-        <p:style>
-          <a:lnRef idx="1">
-            <a:schemeClr val="accent1"/>
-          </a:lnRef>
-          <a:fillRef idx="0">
-            <a:schemeClr val="accent1"/>
-          </a:fillRef>
-          <a:effectRef idx="0">
-            <a:schemeClr val="accent1"/>
-          </a:effectRef>
-          <a:fontRef idx="minor">
-            <a:schemeClr val="tx1"/>
-          </a:fontRef>
-        </p:style>
-      </p:cxnSp>
-      <p:cxnSp>
-        <p:nvCxnSpPr>
-          <p:cNvPr id="8" name="Connecteur droit avec flèche 7"/>
-          <p:cNvCxnSpPr/>
-          <p:nvPr/>
-        </p:nvCxnSpPr>
-        <p:spPr>
-          <a:xfrm>
-            <a:off x="2260504" y="573938"/>
-            <a:ext cx="252000" cy="0"/>
-          </a:xfrm>
-          <a:prstGeom prst="straightConnector1">
-            <a:avLst/>
-          </a:prstGeom>
-          <a:ln w="19050">
-            <a:solidFill>
-              <a:schemeClr val="tx2">
-                <a:lumMod val="60000"/>
-                <a:lumOff val="40000"/>
-              </a:schemeClr>
-            </a:solidFill>
-            <a:tailEnd type="triangle"/>
-          </a:ln>
-        </p:spPr>
-        <p:style>
-          <a:lnRef idx="1">
-            <a:schemeClr val="accent1"/>
-          </a:lnRef>
-          <a:fillRef idx="0">
-            <a:schemeClr val="accent1"/>
-          </a:fillRef>
-          <a:effectRef idx="0">
-            <a:schemeClr val="accent1"/>
-          </a:effectRef>
-          <a:fontRef idx="minor">
-            <a:schemeClr val="tx1"/>
-          </a:fontRef>
-        </p:style>
-      </p:cxnSp>
-      <p:sp>
-        <p:nvSpPr>
-          <p:cNvPr id="9" name="ZoneTexte 8"/>
-          <p:cNvSpPr txBox="1"/>
-          <p:nvPr/>
-        </p:nvSpPr>
-        <p:spPr>
-          <a:xfrm>
-            <a:off x="1359684" y="479348"/>
-            <a:ext cx="848891" cy="200055"/>
-          </a:xfrm>
-          <a:prstGeom prst="rect">
-            <a:avLst/>
-          </a:prstGeom>
-          <a:noFill/>
-          <a:ln>
-            <a:noFill/>
-          </a:ln>
-        </p:spPr>
-        <p:txBody>
-          <a:bodyPr wrap="square" rtlCol="0">
-            <a:spAutoFit/>
-          </a:bodyPr>
-          <a:lstStyle/>
-          <a:p>
-            <a:pPr algn="ctr"/>
-            <a:r>
-              <a:rPr lang="en-US" sz="700" i="1" dirty="0" smtClean="0">
-                <a:solidFill>
-                  <a:schemeClr val="accent1">
-                    <a:lumMod val="50000"/>
-                  </a:schemeClr>
-                </a:solidFill>
-                <a:latin typeface="Roboto" pitchFamily="2" charset="0"/>
-                <a:ea typeface="Roboto" pitchFamily="2" charset="0"/>
-              </a:rPr>
-              <a:t>SEGMENTATION</a:t>
-            </a:r>
-            <a:endParaRPr lang="en-US" sz="700" i="1" dirty="0">
-              <a:solidFill>
-                <a:schemeClr val="accent1">
-                  <a:lumMod val="50000"/>
-                </a:schemeClr>
-              </a:solidFill>
-              <a:latin typeface="Roboto" pitchFamily="2" charset="0"/>
-              <a:ea typeface="Roboto" pitchFamily="2" charset="0"/>
-            </a:endParaRPr>
-          </a:p>
-        </p:txBody>
-      </p:sp>
-      <p:sp>
-        <p:nvSpPr>
-          <p:cNvPr id="10" name="ZoneTexte 9"/>
-          <p:cNvSpPr txBox="1"/>
-          <p:nvPr/>
-        </p:nvSpPr>
-        <p:spPr>
-          <a:xfrm>
-            <a:off x="2637550" y="480367"/>
-            <a:ext cx="906223" cy="292388"/>
-          </a:xfrm>
-          <a:prstGeom prst="rect">
-            <a:avLst/>
-          </a:prstGeom>
-          <a:noFill/>
-          <a:ln>
-            <a:noFill/>
-          </a:ln>
-        </p:spPr>
-        <p:txBody>
-          <a:bodyPr wrap="square" rtlCol="0">
-            <a:spAutoFit/>
-          </a:bodyPr>
-          <a:lstStyle/>
-          <a:p>
-            <a:pPr algn="ctr"/>
-            <a:r>
-              <a:rPr lang="en-US" sz="700" i="1" dirty="0" smtClean="0">
-                <a:solidFill>
-                  <a:schemeClr val="accent1">
-                    <a:lumMod val="50000"/>
-                  </a:schemeClr>
-                </a:solidFill>
-                <a:latin typeface="Roboto" pitchFamily="2" charset="0"/>
-                <a:ea typeface="Roboto" pitchFamily="2" charset="0"/>
-              </a:rPr>
-              <a:t>NORMALIZATION</a:t>
-            </a:r>
-          </a:p>
-          <a:p>
-            <a:pPr algn="ctr"/>
-            <a:r>
-              <a:rPr lang="en-US" sz="600" i="1" dirty="0" smtClean="0">
-                <a:solidFill>
-                  <a:schemeClr val="accent1">
-                    <a:lumMod val="50000"/>
-                  </a:schemeClr>
-                </a:solidFill>
-                <a:latin typeface="Roboto Light" panose="02000000000000000000" pitchFamily="2" charset="0"/>
-                <a:ea typeface="Roboto Light" panose="02000000000000000000" pitchFamily="2" charset="0"/>
-              </a:rPr>
-              <a:t>ART, Dartel, FNIRT…</a:t>
-            </a:r>
-            <a:endParaRPr lang="en-US" sz="500" i="1" dirty="0">
-              <a:solidFill>
-                <a:schemeClr val="accent1">
-                  <a:lumMod val="50000"/>
-                </a:schemeClr>
-              </a:solidFill>
-              <a:latin typeface="Roboto Light" panose="02000000000000000000" pitchFamily="2" charset="0"/>
-              <a:ea typeface="Roboto Light" panose="02000000000000000000" pitchFamily="2" charset="0"/>
-            </a:endParaRPr>
-          </a:p>
-        </p:txBody>
-      </p:sp>
-      <p:sp>
-        <p:nvSpPr>
-          <p:cNvPr id="12" name="ZoneTexte 11"/>
-          <p:cNvSpPr txBox="1"/>
-          <p:nvPr/>
-        </p:nvSpPr>
-        <p:spPr>
-          <a:xfrm>
-            <a:off x="3918650" y="482113"/>
-            <a:ext cx="876711" cy="384721"/>
-          </a:xfrm>
-          <a:prstGeom prst="rect">
-            <a:avLst/>
-          </a:prstGeom>
-          <a:noFill/>
-          <a:ln>
-            <a:noFill/>
-          </a:ln>
-        </p:spPr>
-        <p:txBody>
-          <a:bodyPr wrap="square" rtlCol="0">
-            <a:spAutoFit/>
-          </a:bodyPr>
-          <a:lstStyle/>
-          <a:p>
-            <a:pPr algn="ctr"/>
-            <a:r>
-              <a:rPr lang="en-US" sz="700" i="1" dirty="0" smtClean="0">
-                <a:solidFill>
-                  <a:schemeClr val="accent1">
-                    <a:lumMod val="50000"/>
-                  </a:schemeClr>
-                </a:solidFill>
-                <a:latin typeface="Roboto" pitchFamily="2" charset="0"/>
-                <a:ea typeface="Roboto" pitchFamily="2" charset="0"/>
-              </a:rPr>
-              <a:t>PARCELLATION</a:t>
-            </a:r>
-          </a:p>
-          <a:p>
-            <a:pPr algn="ctr"/>
-            <a:r>
-              <a:rPr lang="en-US" sz="600" i="1" dirty="0" smtClean="0">
-                <a:solidFill>
-                  <a:schemeClr val="accent1">
-                    <a:lumMod val="50000"/>
-                  </a:schemeClr>
-                </a:solidFill>
-                <a:latin typeface="Roboto Light" panose="02000000000000000000" pitchFamily="2" charset="0"/>
-                <a:ea typeface="Roboto Light" panose="02000000000000000000" pitchFamily="2" charset="0"/>
-              </a:rPr>
-              <a:t>Talairach, Harvard-Oxford, AAL…</a:t>
-            </a:r>
-            <a:endParaRPr lang="en-US" sz="600" i="1" dirty="0">
-              <a:solidFill>
-                <a:schemeClr val="accent1">
-                  <a:lumMod val="50000"/>
-                </a:schemeClr>
-              </a:solidFill>
-              <a:latin typeface="Roboto Light" panose="02000000000000000000" pitchFamily="2" charset="0"/>
-              <a:ea typeface="Roboto Light" panose="02000000000000000000" pitchFamily="2" charset="0"/>
-            </a:endParaRPr>
-          </a:p>
-        </p:txBody>
-      </p:sp>
-      <p:cxnSp>
-        <p:nvCxnSpPr>
-          <p:cNvPr id="14" name="Connecteur droit avec flèche 13"/>
-          <p:cNvCxnSpPr/>
-          <p:nvPr/>
-        </p:nvCxnSpPr>
-        <p:spPr>
-          <a:xfrm>
-            <a:off x="982638" y="1474568"/>
-            <a:ext cx="252000" cy="0"/>
-          </a:xfrm>
-          <a:prstGeom prst="straightConnector1">
-            <a:avLst/>
-          </a:prstGeom>
-          <a:ln w="19050">
-            <a:solidFill>
-              <a:schemeClr val="accent2"/>
-            </a:solidFill>
-            <a:tailEnd type="triangle"/>
-          </a:ln>
-        </p:spPr>
-        <p:style>
-          <a:lnRef idx="1">
-            <a:schemeClr val="accent1"/>
-          </a:lnRef>
-          <a:fillRef idx="0">
-            <a:schemeClr val="accent1"/>
-          </a:fillRef>
-          <a:effectRef idx="0">
-            <a:schemeClr val="accent1"/>
-          </a:effectRef>
-          <a:fontRef idx="minor">
-            <a:schemeClr val="tx1"/>
-          </a:fontRef>
-        </p:style>
-      </p:cxnSp>
-      <p:cxnSp>
-        <p:nvCxnSpPr>
-          <p:cNvPr id="16" name="Connecteur droit avec flèche 15"/>
-          <p:cNvCxnSpPr/>
-          <p:nvPr/>
-        </p:nvCxnSpPr>
-        <p:spPr>
-          <a:xfrm>
-            <a:off x="3572064" y="577218"/>
-            <a:ext cx="252000" cy="0"/>
-          </a:xfrm>
-          <a:prstGeom prst="straightConnector1">
-            <a:avLst/>
-          </a:prstGeom>
-          <a:ln w="19050">
-            <a:solidFill>
-              <a:schemeClr val="tx2">
-                <a:lumMod val="60000"/>
-                <a:lumOff val="40000"/>
-              </a:schemeClr>
-            </a:solidFill>
-            <a:tailEnd type="triangle"/>
-          </a:ln>
-        </p:spPr>
-        <p:style>
-          <a:lnRef idx="1">
-            <a:schemeClr val="accent1"/>
-          </a:lnRef>
-          <a:fillRef idx="0">
-            <a:schemeClr val="accent1"/>
-          </a:fillRef>
-          <a:effectRef idx="0">
-            <a:schemeClr val="accent1"/>
-          </a:effectRef>
-          <a:fontRef idx="minor">
-            <a:schemeClr val="tx1"/>
-          </a:fontRef>
-        </p:style>
-      </p:cxnSp>
-      <p:sp>
-        <p:nvSpPr>
-          <p:cNvPr id="17" name="ZoneTexte 16"/>
-          <p:cNvSpPr txBox="1"/>
-          <p:nvPr/>
-        </p:nvSpPr>
-        <p:spPr>
-          <a:xfrm>
-            <a:off x="1331913" y="1047836"/>
-            <a:ext cx="888123" cy="200055"/>
-          </a:xfrm>
-          <a:prstGeom prst="rect">
-            <a:avLst/>
-          </a:prstGeom>
-          <a:solidFill>
-            <a:schemeClr val="accent2"/>
-          </a:solidFill>
-          <a:ln>
-            <a:noFill/>
-          </a:ln>
-        </p:spPr>
-        <p:txBody>
-          <a:bodyPr wrap="square" rtlCol="0">
-            <a:spAutoFit/>
-          </a:bodyPr>
-          <a:lstStyle/>
-          <a:p>
-            <a:pPr algn="ctr"/>
-            <a:r>
-              <a:rPr lang="en-US" sz="700" i="1" dirty="0" smtClean="0">
-                <a:solidFill>
-                  <a:schemeClr val="bg1"/>
-                </a:solidFill>
-                <a:latin typeface="Roboto" pitchFamily="2" charset="0"/>
-                <a:ea typeface="Roboto" pitchFamily="2" charset="0"/>
-              </a:rPr>
-              <a:t>PREPROCESSING</a:t>
-            </a:r>
-            <a:endParaRPr lang="en-US" sz="700" i="1" dirty="0">
-              <a:solidFill>
-                <a:schemeClr val="bg1"/>
-              </a:solidFill>
-              <a:latin typeface="Roboto" pitchFamily="2" charset="0"/>
-              <a:ea typeface="Roboto" pitchFamily="2" charset="0"/>
-            </a:endParaRPr>
-          </a:p>
-        </p:txBody>
-      </p:sp>
-      <p:cxnSp>
-        <p:nvCxnSpPr>
-          <p:cNvPr id="18" name="Connecteur droit avec flèche 17"/>
-          <p:cNvCxnSpPr/>
-          <p:nvPr/>
-        </p:nvCxnSpPr>
-        <p:spPr>
-          <a:xfrm>
-            <a:off x="2266950" y="1474568"/>
-            <a:ext cx="252000" cy="0"/>
-          </a:xfrm>
-          <a:prstGeom prst="straightConnector1">
-            <a:avLst/>
-          </a:prstGeom>
-          <a:ln w="19050">
-            <a:solidFill>
-              <a:schemeClr val="accent2"/>
-            </a:solidFill>
-            <a:tailEnd type="triangle"/>
-          </a:ln>
-        </p:spPr>
-        <p:style>
-          <a:lnRef idx="1">
-            <a:schemeClr val="accent1"/>
-          </a:lnRef>
-          <a:fillRef idx="0">
-            <a:schemeClr val="accent1"/>
-          </a:fillRef>
-          <a:effectRef idx="0">
-            <a:schemeClr val="accent1"/>
-          </a:effectRef>
-          <a:fontRef idx="minor">
-            <a:schemeClr val="tx1"/>
-          </a:fontRef>
-        </p:style>
-      </p:cxnSp>
-      <p:sp>
-        <p:nvSpPr>
-          <p:cNvPr id="20" name="ZoneTexte 19"/>
-          <p:cNvSpPr txBox="1"/>
-          <p:nvPr/>
-        </p:nvSpPr>
-        <p:spPr>
-          <a:xfrm>
-            <a:off x="2637550" y="1047836"/>
-            <a:ext cx="888123" cy="1231106"/>
-          </a:xfrm>
-          <a:prstGeom prst="rect">
-            <a:avLst/>
-          </a:prstGeom>
-          <a:noFill/>
-          <a:ln>
-            <a:solidFill>
-              <a:schemeClr val="accent2"/>
-            </a:solidFill>
-          </a:ln>
-        </p:spPr>
-        <p:txBody>
-          <a:bodyPr wrap="square" rtlCol="0">
-            <a:spAutoFit/>
-          </a:bodyPr>
-          <a:lstStyle/>
-          <a:p>
-            <a:pPr algn="ctr">
-              <a:lnSpc>
-                <a:spcPct val="150000"/>
-              </a:lnSpc>
-            </a:pPr>
-            <a:endParaRPr lang="en-US" sz="600" i="1" dirty="0" smtClean="0">
-              <a:solidFill>
-                <a:schemeClr val="accent2">
-                  <a:lumMod val="75000"/>
-                </a:schemeClr>
-              </a:solidFill>
-              <a:latin typeface="Roboto" pitchFamily="2" charset="0"/>
-              <a:ea typeface="Roboto" pitchFamily="2" charset="0"/>
-            </a:endParaRPr>
-          </a:p>
-          <a:p>
-            <a:pPr algn="ctr">
-              <a:lnSpc>
-                <a:spcPct val="125000"/>
-              </a:lnSpc>
-              <a:spcBef>
-                <a:spcPts val="600"/>
-              </a:spcBef>
-            </a:pPr>
-            <a:r>
-              <a:rPr lang="en-US" sz="600" dirty="0" smtClean="0">
-                <a:solidFill>
-                  <a:schemeClr val="accent2">
-                    <a:lumMod val="75000"/>
-                  </a:schemeClr>
-                </a:solidFill>
-                <a:latin typeface="Roboto" pitchFamily="2" charset="0"/>
-                <a:ea typeface="Roboto" pitchFamily="2" charset="0"/>
-              </a:rPr>
-              <a:t>GENERAL LINEAR MODEL</a:t>
-            </a:r>
-          </a:p>
-          <a:p>
-            <a:pPr algn="ctr">
-              <a:lnSpc>
-                <a:spcPct val="125000"/>
-              </a:lnSpc>
-            </a:pPr>
-            <a:r>
-              <a:rPr lang="en-US" sz="600" dirty="0" smtClean="0">
-                <a:solidFill>
-                  <a:schemeClr val="accent2">
-                    <a:lumMod val="75000"/>
-                  </a:schemeClr>
-                </a:solidFill>
-                <a:latin typeface="Roboto" pitchFamily="2" charset="0"/>
-                <a:ea typeface="Roboto" pitchFamily="2" charset="0"/>
-              </a:rPr>
-              <a:t>▼</a:t>
-            </a:r>
-            <a:endParaRPr lang="en-US" sz="600" dirty="0">
-              <a:solidFill>
-                <a:schemeClr val="accent2">
-                  <a:lumMod val="75000"/>
-                </a:schemeClr>
-              </a:solidFill>
-              <a:latin typeface="Roboto" pitchFamily="2" charset="0"/>
-              <a:ea typeface="Roboto" pitchFamily="2" charset="0"/>
-            </a:endParaRPr>
-          </a:p>
-          <a:p>
-            <a:pPr algn="ctr">
-              <a:lnSpc>
-                <a:spcPct val="125000"/>
-              </a:lnSpc>
-            </a:pPr>
-            <a:r>
-              <a:rPr lang="en-US" sz="600" dirty="0" smtClean="0">
-                <a:solidFill>
-                  <a:schemeClr val="accent2">
-                    <a:lumMod val="75000"/>
-                  </a:schemeClr>
-                </a:solidFill>
-                <a:latin typeface="Roboto" pitchFamily="2" charset="0"/>
-                <a:ea typeface="Roboto" pitchFamily="2" charset="0"/>
-              </a:rPr>
-              <a:t>STATISTIC</a:t>
-            </a:r>
-          </a:p>
-          <a:p>
-            <a:pPr algn="ctr">
-              <a:lnSpc>
-                <a:spcPct val="125000"/>
-              </a:lnSpc>
-            </a:pPr>
-            <a:r>
-              <a:rPr lang="en-US" sz="600" dirty="0" smtClean="0">
-                <a:solidFill>
-                  <a:schemeClr val="accent2">
-                    <a:lumMod val="75000"/>
-                  </a:schemeClr>
-                </a:solidFill>
-                <a:latin typeface="Roboto" pitchFamily="2" charset="0"/>
-                <a:ea typeface="Roboto" pitchFamily="2" charset="0"/>
-              </a:rPr>
-              <a:t>▼</a:t>
-            </a:r>
-            <a:endParaRPr lang="en-US" sz="600" dirty="0">
-              <a:solidFill>
-                <a:schemeClr val="accent2">
-                  <a:lumMod val="75000"/>
-                </a:schemeClr>
-              </a:solidFill>
-              <a:latin typeface="Roboto" pitchFamily="2" charset="0"/>
-              <a:ea typeface="Roboto" pitchFamily="2" charset="0"/>
-            </a:endParaRPr>
-          </a:p>
-          <a:p>
-            <a:pPr algn="ctr">
-              <a:lnSpc>
-                <a:spcPct val="125000"/>
-              </a:lnSpc>
-            </a:pPr>
-            <a:r>
-              <a:rPr lang="en-US" sz="600" dirty="0" smtClean="0">
-                <a:solidFill>
-                  <a:schemeClr val="accent2">
-                    <a:lumMod val="75000"/>
-                  </a:schemeClr>
-                </a:solidFill>
-                <a:latin typeface="Roboto" pitchFamily="2" charset="0"/>
-                <a:ea typeface="Roboto" pitchFamily="2" charset="0"/>
-              </a:rPr>
-              <a:t>THRESHOLDING</a:t>
-            </a:r>
-          </a:p>
-          <a:p>
-            <a:pPr algn="ctr"/>
-            <a:r>
-              <a:rPr lang="en-US" sz="500" i="1" dirty="0" smtClean="0">
-                <a:solidFill>
-                  <a:schemeClr val="accent2">
-                    <a:lumMod val="75000"/>
-                  </a:schemeClr>
-                </a:solidFill>
-                <a:latin typeface="Roboto Light" panose="02000000000000000000" pitchFamily="2" charset="0"/>
-                <a:ea typeface="Roboto Light" panose="02000000000000000000" pitchFamily="2" charset="0"/>
-              </a:rPr>
-              <a:t>Random Gaussian fields, Monte-Carlo, permutation-based…</a:t>
-            </a:r>
-          </a:p>
-        </p:txBody>
-      </p:sp>
-      <p:sp>
-        <p:nvSpPr>
-          <p:cNvPr id="21" name="ZoneTexte 20"/>
-          <p:cNvSpPr txBox="1"/>
-          <p:nvPr/>
-        </p:nvSpPr>
-        <p:spPr>
-          <a:xfrm>
-            <a:off x="2637550" y="1047836"/>
-            <a:ext cx="888123" cy="200055"/>
-          </a:xfrm>
-          <a:prstGeom prst="rect">
-            <a:avLst/>
-          </a:prstGeom>
-          <a:solidFill>
-            <a:schemeClr val="accent2"/>
-          </a:solidFill>
-          <a:ln>
-            <a:noFill/>
-          </a:ln>
-        </p:spPr>
-        <p:txBody>
-          <a:bodyPr wrap="square" rtlCol="0">
-            <a:spAutoFit/>
-          </a:bodyPr>
-          <a:lstStyle/>
-          <a:p>
-            <a:pPr algn="ctr"/>
-            <a:r>
-              <a:rPr lang="en-US" sz="700" i="1" dirty="0" smtClean="0">
-                <a:solidFill>
-                  <a:schemeClr val="bg1"/>
-                </a:solidFill>
-                <a:latin typeface="Roboto" pitchFamily="2" charset="0"/>
-                <a:ea typeface="Roboto" pitchFamily="2" charset="0"/>
-              </a:rPr>
-              <a:t>ACTIVATION</a:t>
-            </a:r>
-            <a:endParaRPr lang="en-US" sz="700" i="1" dirty="0">
-              <a:solidFill>
-                <a:schemeClr val="bg1"/>
-              </a:solidFill>
-              <a:latin typeface="Roboto" pitchFamily="2" charset="0"/>
-              <a:ea typeface="Roboto" pitchFamily="2" charset="0"/>
-            </a:endParaRPr>
-          </a:p>
-        </p:txBody>
-      </p:sp>
-      <p:grpSp>
-        <p:nvGrpSpPr>
-          <p:cNvPr id="30" name="Groupe 29"/>
-          <p:cNvGrpSpPr/>
-          <p:nvPr/>
-        </p:nvGrpSpPr>
-        <p:grpSpPr>
-          <a:xfrm>
-            <a:off x="3911390" y="1047836"/>
-            <a:ext cx="889200" cy="1161857"/>
-            <a:chOff x="3743438" y="1009932"/>
-            <a:chExt cx="889200" cy="1161857"/>
-          </a:xfrm>
-        </p:grpSpPr>
-        <p:sp>
-          <p:nvSpPr>
-            <p:cNvPr id="26" name="ZoneTexte 25"/>
-            <p:cNvSpPr txBox="1"/>
-            <p:nvPr/>
-          </p:nvSpPr>
-          <p:spPr>
-            <a:xfrm>
-              <a:off x="3743438" y="1009932"/>
-              <a:ext cx="889200" cy="1161857"/>
-            </a:xfrm>
-            <a:prstGeom prst="rect">
-              <a:avLst/>
-            </a:prstGeom>
-            <a:noFill/>
-            <a:ln>
-              <a:solidFill>
-                <a:schemeClr val="tx1">
-                  <a:lumMod val="75000"/>
-                  <a:lumOff val="25000"/>
-                </a:schemeClr>
-              </a:solidFill>
-            </a:ln>
-          </p:spPr>
-          <p:txBody>
-            <a:bodyPr wrap="square" numCol="1" rtlCol="0">
-              <a:spAutoFit/>
-            </a:bodyPr>
-            <a:lstStyle/>
-            <a:p>
-              <a:pPr algn="ctr">
-                <a:lnSpc>
-                  <a:spcPct val="150000"/>
-                </a:lnSpc>
-              </a:pPr>
-              <a:endParaRPr lang="en-US" sz="600" i="1" dirty="0" smtClean="0">
-                <a:solidFill>
-                  <a:srgbClr val="C00000"/>
-                </a:solidFill>
-                <a:latin typeface="Roboto" pitchFamily="2" charset="0"/>
-                <a:ea typeface="Roboto" pitchFamily="2" charset="0"/>
-              </a:endParaRPr>
-            </a:p>
-            <a:p>
-              <a:pPr algn="ctr">
-                <a:lnSpc>
-                  <a:spcPct val="150000"/>
-                </a:lnSpc>
-              </a:pPr>
-              <a:r>
-                <a:rPr lang="en-US" sz="700" dirty="0" smtClean="0">
-                  <a:solidFill>
-                    <a:srgbClr val="C00000"/>
-                  </a:solidFill>
-                  <a:latin typeface="Roboto" pitchFamily="2" charset="0"/>
-                  <a:ea typeface="Roboto" pitchFamily="2" charset="0"/>
-                </a:rPr>
-                <a:t>ICA</a:t>
-              </a:r>
-            </a:p>
-            <a:p>
-              <a:pPr algn="ctr">
-                <a:lnSpc>
-                  <a:spcPct val="125000"/>
-                </a:lnSpc>
-                <a:spcAft>
-                  <a:spcPts val="800"/>
-                </a:spcAft>
-              </a:pPr>
-              <a:r>
-                <a:rPr lang="en-US" sz="600" dirty="0" smtClean="0">
-                  <a:solidFill>
-                    <a:schemeClr val="tx1">
-                      <a:lumMod val="75000"/>
-                      <a:lumOff val="25000"/>
-                    </a:schemeClr>
-                  </a:solidFill>
-                  <a:latin typeface="Roboto" pitchFamily="2" charset="0"/>
-                  <a:ea typeface="Roboto" pitchFamily="2" charset="0"/>
-                </a:rPr>
-                <a:t>ICA</a:t>
-              </a:r>
-            </a:p>
-            <a:p>
-              <a:pPr algn="ctr">
-                <a:lnSpc>
-                  <a:spcPct val="125000"/>
-                </a:lnSpc>
-                <a:spcAft>
-                  <a:spcPts val="800"/>
-                </a:spcAft>
-              </a:pPr>
-              <a:r>
-                <a:rPr lang="en-US" sz="600" dirty="0" smtClean="0">
-                  <a:solidFill>
-                    <a:schemeClr val="tx1">
-                      <a:lumMod val="75000"/>
-                      <a:lumOff val="25000"/>
-                    </a:schemeClr>
-                  </a:solidFill>
-                  <a:latin typeface="Roboto" pitchFamily="2" charset="0"/>
-                  <a:ea typeface="Roboto" pitchFamily="2" charset="0"/>
-                </a:rPr>
-                <a:t>ROI-to-ROI</a:t>
-              </a:r>
-            </a:p>
-            <a:p>
-              <a:pPr algn="ctr">
-                <a:lnSpc>
-                  <a:spcPct val="125000"/>
-                </a:lnSpc>
-                <a:spcAft>
-                  <a:spcPts val="800"/>
-                </a:spcAft>
-              </a:pPr>
-              <a:r>
-                <a:rPr lang="en-US" sz="600" dirty="0" smtClean="0">
-                  <a:solidFill>
-                    <a:schemeClr val="tx1">
-                      <a:lumMod val="75000"/>
-                      <a:lumOff val="25000"/>
-                    </a:schemeClr>
-                  </a:solidFill>
-                  <a:latin typeface="Roboto" pitchFamily="2" charset="0"/>
-                  <a:ea typeface="Roboto" pitchFamily="2" charset="0"/>
-                </a:rPr>
-                <a:t>SEED-BASED</a:t>
-              </a:r>
-            </a:p>
-            <a:p>
-              <a:pPr algn="ctr">
-                <a:lnSpc>
-                  <a:spcPct val="125000"/>
-                </a:lnSpc>
-                <a:spcAft>
-                  <a:spcPts val="800"/>
-                </a:spcAft>
-              </a:pPr>
-              <a:r>
-                <a:rPr lang="en-US" sz="600" dirty="0" smtClean="0">
-                  <a:solidFill>
-                    <a:schemeClr val="tx1">
-                      <a:lumMod val="75000"/>
-                      <a:lumOff val="25000"/>
-                    </a:schemeClr>
-                  </a:solidFill>
-                  <a:latin typeface="Roboto" pitchFamily="2" charset="0"/>
-                  <a:ea typeface="Roboto" pitchFamily="2" charset="0"/>
-                </a:rPr>
-                <a:t>GRAPH-BASED</a:t>
-              </a:r>
-            </a:p>
-          </p:txBody>
-        </p:sp>
-        <p:sp>
-          <p:nvSpPr>
-            <p:cNvPr id="27" name="ZoneTexte 26"/>
-            <p:cNvSpPr txBox="1"/>
-            <p:nvPr/>
-          </p:nvSpPr>
-          <p:spPr>
-            <a:xfrm>
-              <a:off x="3743438" y="1009932"/>
-              <a:ext cx="889200" cy="307777"/>
-            </a:xfrm>
-            <a:prstGeom prst="rect">
-              <a:avLst/>
-            </a:prstGeom>
-            <a:solidFill>
-              <a:schemeClr val="tx1">
-                <a:lumMod val="75000"/>
-                <a:lumOff val="25000"/>
-              </a:schemeClr>
-            </a:solidFill>
-            <a:ln>
-              <a:solidFill>
-                <a:schemeClr val="tx1">
-                  <a:lumMod val="75000"/>
-                  <a:lumOff val="25000"/>
-                </a:schemeClr>
-              </a:solidFill>
-            </a:ln>
-          </p:spPr>
-          <p:txBody>
-            <a:bodyPr wrap="square" numCol="1" rtlCol="0">
-              <a:spAutoFit/>
-            </a:bodyPr>
-            <a:lstStyle/>
-            <a:p>
-              <a:pPr algn="ctr"/>
-              <a:r>
-                <a:rPr lang="en-US" sz="700" i="1" dirty="0" smtClean="0">
-                  <a:solidFill>
-                    <a:schemeClr val="bg1"/>
-                  </a:solidFill>
-                  <a:latin typeface="Roboto" pitchFamily="2" charset="0"/>
-                  <a:ea typeface="Roboto" pitchFamily="2" charset="0"/>
-                </a:rPr>
-                <a:t>FUNCTIONAL</a:t>
-              </a:r>
-            </a:p>
-            <a:p>
-              <a:pPr algn="ctr"/>
-              <a:r>
-                <a:rPr lang="en-US" sz="700" i="1" dirty="0" smtClean="0">
-                  <a:solidFill>
-                    <a:schemeClr val="bg1"/>
-                  </a:solidFill>
-                  <a:latin typeface="Roboto" pitchFamily="2" charset="0"/>
-                  <a:ea typeface="Roboto" pitchFamily="2" charset="0"/>
-                </a:rPr>
-                <a:t>CONNECTIVITY</a:t>
-              </a:r>
-              <a:endParaRPr lang="en-US" sz="700" i="1" dirty="0">
-                <a:solidFill>
-                  <a:schemeClr val="bg1"/>
-                </a:solidFill>
-                <a:latin typeface="Roboto" pitchFamily="2" charset="0"/>
-                <a:ea typeface="Roboto" pitchFamily="2" charset="0"/>
-              </a:endParaRPr>
-            </a:p>
-          </p:txBody>
-        </p:sp>
-      </p:grpSp>
-      <p:cxnSp>
-        <p:nvCxnSpPr>
-          <p:cNvPr id="32" name="Connecteur droit 31"/>
-          <p:cNvCxnSpPr/>
-          <p:nvPr/>
-        </p:nvCxnSpPr>
-        <p:spPr>
-          <a:xfrm>
-            <a:off x="3906161" y="1546879"/>
-            <a:ext cx="889200" cy="0"/>
-          </a:xfrm>
-          <a:prstGeom prst="line">
-            <a:avLst/>
-          </a:prstGeom>
-          <a:ln>
-            <a:solidFill>
-              <a:schemeClr val="tx1">
-                <a:lumMod val="75000"/>
-                <a:lumOff val="25000"/>
-              </a:schemeClr>
-            </a:solidFill>
-          </a:ln>
-        </p:spPr>
-        <p:style>
-          <a:lnRef idx="1">
-            <a:schemeClr val="accent1"/>
-          </a:lnRef>
-          <a:fillRef idx="0">
-            <a:schemeClr val="accent1"/>
-          </a:fillRef>
-          <a:effectRef idx="0">
-            <a:schemeClr val="accent1"/>
-          </a:effectRef>
-          <a:fontRef idx="minor">
-            <a:schemeClr val="tx1"/>
-          </a:fontRef>
-        </p:style>
-      </p:cxnSp>
-      <p:cxnSp>
-        <p:nvCxnSpPr>
-          <p:cNvPr id="33" name="Connecteur droit 32"/>
-          <p:cNvCxnSpPr/>
-          <p:nvPr/>
-        </p:nvCxnSpPr>
-        <p:spPr>
-          <a:xfrm>
-            <a:off x="3906161" y="1994980"/>
-            <a:ext cx="889200" cy="0"/>
-          </a:xfrm>
-          <a:prstGeom prst="line">
-            <a:avLst/>
-          </a:prstGeom>
-          <a:ln>
-            <a:solidFill>
-              <a:schemeClr val="tx1">
-                <a:lumMod val="75000"/>
-                <a:lumOff val="25000"/>
-              </a:schemeClr>
-            </a:solidFill>
-          </a:ln>
-        </p:spPr>
-        <p:style>
-          <a:lnRef idx="1">
-            <a:schemeClr val="accent1"/>
-          </a:lnRef>
-          <a:fillRef idx="0">
-            <a:schemeClr val="accent1"/>
-          </a:fillRef>
-          <a:effectRef idx="0">
-            <a:schemeClr val="accent1"/>
-          </a:effectRef>
-          <a:fontRef idx="minor">
-            <a:schemeClr val="tx1"/>
-          </a:fontRef>
-        </p:style>
-      </p:cxnSp>
-      <p:cxnSp>
-        <p:nvCxnSpPr>
-          <p:cNvPr id="42" name="Connecteur en angle 41"/>
-          <p:cNvCxnSpPr>
-            <a:stCxn id="10" idx="2"/>
-          </p:cNvCxnSpPr>
-          <p:nvPr/>
-        </p:nvCxnSpPr>
-        <p:spPr>
-          <a:xfrm rot="5400000">
-            <a:off x="2403502" y="145227"/>
-            <a:ext cx="59632" cy="1314688"/>
-          </a:xfrm>
-          <a:prstGeom prst="bentConnector2">
-            <a:avLst/>
-          </a:prstGeom>
-          <a:ln w="9525">
-            <a:solidFill>
-              <a:schemeClr val="tx1">
-                <a:lumMod val="65000"/>
-                <a:lumOff val="35000"/>
-              </a:schemeClr>
-            </a:solidFill>
-            <a:prstDash val="solid"/>
-            <a:headEnd type="none" w="med" len="med"/>
-            <a:tailEnd type="none" w="med" len="med"/>
-          </a:ln>
-        </p:spPr>
-        <p:style>
-          <a:lnRef idx="1">
-            <a:schemeClr val="accent1"/>
-          </a:lnRef>
-          <a:fillRef idx="0">
-            <a:schemeClr val="accent1"/>
-          </a:fillRef>
-          <a:effectRef idx="0">
-            <a:schemeClr val="accent1"/>
-          </a:effectRef>
-          <a:fontRef idx="minor">
-            <a:schemeClr val="tx1"/>
-          </a:fontRef>
-        </p:style>
-      </p:cxnSp>
-      <p:cxnSp>
-        <p:nvCxnSpPr>
-          <p:cNvPr id="43" name="Connecteur droit avec flèche 42"/>
-          <p:cNvCxnSpPr/>
-          <p:nvPr/>
-        </p:nvCxnSpPr>
-        <p:spPr>
-          <a:xfrm rot="5400000">
-            <a:off x="1685974" y="922190"/>
-            <a:ext cx="180000" cy="0"/>
-          </a:xfrm>
-          <a:prstGeom prst="straightConnector1">
-            <a:avLst/>
-          </a:prstGeom>
-          <a:ln w="9525">
-            <a:solidFill>
-              <a:schemeClr val="bg2">
-                <a:lumMod val="25000"/>
-              </a:schemeClr>
-            </a:solidFill>
-            <a:prstDash val="solid"/>
-            <a:tailEnd type="triangle"/>
-          </a:ln>
-        </p:spPr>
-        <p:style>
-          <a:lnRef idx="1">
-            <a:schemeClr val="accent1"/>
-          </a:lnRef>
-          <a:fillRef idx="0">
-            <a:schemeClr val="accent1"/>
-          </a:fillRef>
-          <a:effectRef idx="0">
-            <a:schemeClr val="accent1"/>
-          </a:effectRef>
-          <a:fontRef idx="minor">
-            <a:schemeClr val="tx1"/>
-          </a:fontRef>
-        </p:style>
-      </p:cxnSp>
-      <p:cxnSp>
-        <p:nvCxnSpPr>
-          <p:cNvPr id="50" name="Connecteur droit avec flèche 49"/>
-          <p:cNvCxnSpPr/>
-          <p:nvPr/>
-        </p:nvCxnSpPr>
-        <p:spPr>
-          <a:xfrm rot="5400000">
-            <a:off x="4288319" y="932956"/>
-            <a:ext cx="144000" cy="0"/>
-          </a:xfrm>
-          <a:prstGeom prst="straightConnector1">
-            <a:avLst/>
-          </a:prstGeom>
-          <a:ln w="9525">
-            <a:solidFill>
-              <a:schemeClr val="tx1">
-                <a:lumMod val="65000"/>
-                <a:lumOff val="35000"/>
-              </a:schemeClr>
-            </a:solidFill>
-            <a:prstDash val="solid"/>
-            <a:tailEnd type="triangle"/>
-          </a:ln>
-        </p:spPr>
-        <p:style>
-          <a:lnRef idx="1">
-            <a:schemeClr val="accent1"/>
-          </a:lnRef>
-          <a:fillRef idx="0">
-            <a:schemeClr val="accent1"/>
-          </a:fillRef>
-          <a:effectRef idx="0">
-            <a:schemeClr val="accent1"/>
-          </a:effectRef>
-          <a:fontRef idx="minor">
-            <a:schemeClr val="tx1"/>
-          </a:fontRef>
-        </p:style>
-      </p:cxnSp>
-    </p:spTree>
-    <p:extLst>
-      <p:ext uri="{BB962C8B-B14F-4D97-AF65-F5344CB8AC3E}">
-        <p14:creationId xmlns:p14="http://schemas.microsoft.com/office/powerpoint/2010/main" val="3726677745"/>
       </p:ext>
     </p:extLst>
   </p:cSld>

</xml_diff>